<commit_message>
Working 2D trajectories and in_basket, worked on 3D a bit (plotting still not working)
</commit_message>
<xml_diff>
--- a/Weekly Presentations/Week 2.pptx
+++ b/Weekly Presentations/Week 2.pptx
@@ -112,6 +112,11 @@
       </a:defRPr>
     </a:lvl9pPr>
   </p:defaultTextStyle>
+  <p:extLst>
+    <p:ext uri="{EFAFB233-063F-42B5-8137-9DF3F51BA10A}">
+      <p15:sldGuideLst xmlns:p15="http://schemas.microsoft.com/office/powerpoint/2012/main"/>
+    </p:ext>
+  </p:extLst>
 </p:presentation>
 </file>
 
@@ -3482,12 +3487,14 @@
         </p:nvSpPr>
         <p:spPr/>
         <p:txBody>
-          <a:bodyPr/>
+          <a:bodyPr>
+            <a:normAutofit/>
+          </a:bodyPr>
           <a:lstStyle/>
           <a:p>
             <a:r>
               <a:rPr lang="en-US" dirty="0"/>
-              <a:t>Introduced backboard for plots</a:t>
+              <a:t>Introduced backboard for 2D plots (wrote code for 3D but couldn’t test it because of issue importing 3d plotting), added a try-except condition for if the ball does/doesn’t hit the backboard</a:t>
             </a:r>
           </a:p>
           <a:p>
@@ -3505,7 +3512,7 @@
           <a:p>
             <a:r>
               <a:rPr lang="en-US" dirty="0"/>
-              <a:t>Added a function in 2d-shot.py to check whether the basketball made it in the basket</a:t>
+              <a:t>Added a function in both 2d-shot.py and 3d-shot.py to check whether the basketball made it in the basket (only assumes bounce off the backboard – no bouncing off the rim later)</a:t>
             </a:r>
           </a:p>
         </p:txBody>
@@ -3561,7 +3568,14 @@
           <a:bodyPr/>
           <a:lstStyle/>
           <a:p>
-            <a:endParaRPr lang="en-US" dirty="0"/>
+            <a:r>
+              <a:rPr lang="en-US" dirty="0" err="1"/>
+              <a:t>Start_height</a:t>
+            </a:r>
+            <a:r>
+              <a:rPr lang="en-US" dirty="0"/>
+              <a:t> = 1.8; v0 = 9.8; angle = 80</a:t>
+            </a:r>
           </a:p>
         </p:txBody>
       </p:sp>
@@ -3594,31 +3608,35 @@
           </a:p>
         </p:txBody>
       </p:sp>
-      <p:sp>
-        <p:nvSpPr>
-          <p:cNvPr id="4" name="Content Placeholder 3">
-            <a:extLst>
-              <a:ext uri="{FF2B5EF4-FFF2-40B4-BE49-F238E27FC236}">
-                <a16:creationId xmlns:a16="http://schemas.microsoft.com/office/drawing/2014/main" id="{DDFC7DCE-4BDA-9748-9BC2-13CF4E6C35B2}"/>
-              </a:ext>
-            </a:extLst>
-          </p:cNvPr>
-          <p:cNvSpPr>
-            <a:spLocks noGrp="1"/>
-          </p:cNvSpPr>
+      <p:pic>
+        <p:nvPicPr>
+          <p:cNvPr id="8" name="Content Placeholder 7">
+            <a:extLst>
+              <a:ext uri="{FF2B5EF4-FFF2-40B4-BE49-F238E27FC236}">
+                <a16:creationId xmlns:a16="http://schemas.microsoft.com/office/drawing/2014/main" id="{5DD960D8-EFE7-2B44-B81F-AF0C1AED1C2C}"/>
+              </a:ext>
+            </a:extLst>
+          </p:cNvPr>
+          <p:cNvPicPr>
+            <a:picLocks noGrp="1" noChangeAspect="1"/>
+          </p:cNvPicPr>
           <p:nvPr>
             <p:ph sz="half" idx="2"/>
           </p:nvPr>
-        </p:nvSpPr>
-        <p:spPr/>
-        <p:txBody>
-          <a:bodyPr/>
-          <a:lstStyle/>
-          <a:p>
-            <a:endParaRPr lang="en-US"/>
-          </a:p>
-        </p:txBody>
-      </p:sp>
+        </p:nvPicPr>
+        <p:blipFill>
+          <a:blip r:embed="rId2"/>
+          <a:stretch>
+            <a:fillRect/>
+          </a:stretch>
+        </p:blipFill>
+        <p:spPr>
+          <a:xfrm>
+            <a:off x="1075905" y="2505075"/>
+            <a:ext cx="4685553" cy="3684588"/>
+          </a:xfrm>
+        </p:spPr>
+      </p:pic>
       <p:sp>
         <p:nvSpPr>
           <p:cNvPr id="5" name="Text Placeholder 4">
@@ -3647,31 +3665,35 @@
           </a:p>
         </p:txBody>
       </p:sp>
-      <p:sp>
-        <p:nvSpPr>
-          <p:cNvPr id="6" name="Content Placeholder 5">
-            <a:extLst>
-              <a:ext uri="{FF2B5EF4-FFF2-40B4-BE49-F238E27FC236}">
-                <a16:creationId xmlns:a16="http://schemas.microsoft.com/office/drawing/2014/main" id="{94C783BA-4CCB-5149-912F-B0F775BEDD89}"/>
-              </a:ext>
-            </a:extLst>
-          </p:cNvPr>
-          <p:cNvSpPr>
-            <a:spLocks noGrp="1"/>
-          </p:cNvSpPr>
+      <p:pic>
+        <p:nvPicPr>
+          <p:cNvPr id="10" name="Content Placeholder 9">
+            <a:extLst>
+              <a:ext uri="{FF2B5EF4-FFF2-40B4-BE49-F238E27FC236}">
+                <a16:creationId xmlns:a16="http://schemas.microsoft.com/office/drawing/2014/main" id="{1E8E670C-962E-A147-8BD2-DE7BCCCB58D4}"/>
+              </a:ext>
+            </a:extLst>
+          </p:cNvPr>
+          <p:cNvPicPr>
+            <a:picLocks noGrp="1" noChangeAspect="1"/>
+          </p:cNvPicPr>
           <p:nvPr>
             <p:ph sz="quarter" idx="4"/>
           </p:nvPr>
-        </p:nvSpPr>
-        <p:spPr/>
-        <p:txBody>
-          <a:bodyPr/>
-          <a:lstStyle/>
-          <a:p>
-            <a:endParaRPr lang="en-US"/>
-          </a:p>
-        </p:txBody>
-      </p:sp>
+        </p:nvPicPr>
+        <p:blipFill>
+          <a:blip r:embed="rId3"/>
+          <a:stretch>
+            <a:fillRect/>
+          </a:stretch>
+        </p:blipFill>
+        <p:spPr>
+          <a:xfrm>
+            <a:off x="6421017" y="2505075"/>
+            <a:ext cx="4685553" cy="3684588"/>
+          </a:xfrm>
+        </p:spPr>
+      </p:pic>
     </p:spTree>
     <p:extLst>
       <p:ext uri="{BB962C8B-B14F-4D97-AF65-F5344CB8AC3E}">
@@ -3723,7 +3745,22 @@
           <a:bodyPr/>
           <a:lstStyle/>
           <a:p>
-            <a:endParaRPr lang="en-US"/>
+            <a:r>
+              <a:rPr lang="en-US" dirty="0" err="1"/>
+              <a:t>Start_height</a:t>
+            </a:r>
+            <a:r>
+              <a:rPr lang="en-US" dirty="0"/>
+              <a:t> = 1.8; v0 = 9.8; angle = 80; </a:t>
+            </a:r>
+            <a:r>
+              <a:rPr lang="en-US" dirty="0" err="1"/>
+              <a:t>distance_backboard</a:t>
+            </a:r>
+            <a:r>
+              <a:rPr lang="en-US" dirty="0"/>
+              <a:t> = 2.5</a:t>
+            </a:r>
           </a:p>
         </p:txBody>
       </p:sp>
@@ -3755,31 +3792,35 @@
           </a:p>
         </p:txBody>
       </p:sp>
-      <p:sp>
-        <p:nvSpPr>
-          <p:cNvPr id="4" name="Content Placeholder 3">
-            <a:extLst>
-              <a:ext uri="{FF2B5EF4-FFF2-40B4-BE49-F238E27FC236}">
-                <a16:creationId xmlns:a16="http://schemas.microsoft.com/office/drawing/2014/main" id="{07FB45CD-E07B-0D4F-8543-DF1168EA217B}"/>
-              </a:ext>
-            </a:extLst>
-          </p:cNvPr>
-          <p:cNvSpPr>
-            <a:spLocks noGrp="1"/>
-          </p:cNvSpPr>
+      <p:pic>
+        <p:nvPicPr>
+          <p:cNvPr id="8" name="Content Placeholder 7" descr="A screenshot of a cell phone&#10;&#10;Description automatically generated">
+            <a:extLst>
+              <a:ext uri="{FF2B5EF4-FFF2-40B4-BE49-F238E27FC236}">
+                <a16:creationId xmlns:a16="http://schemas.microsoft.com/office/drawing/2014/main" id="{CE8C220E-97E7-3942-8EA8-EFF6BBBFEE84}"/>
+              </a:ext>
+            </a:extLst>
+          </p:cNvPr>
+          <p:cNvPicPr>
+            <a:picLocks noGrp="1" noChangeAspect="1"/>
+          </p:cNvPicPr>
           <p:nvPr>
             <p:ph sz="half" idx="2"/>
           </p:nvPr>
-        </p:nvSpPr>
-        <p:spPr/>
-        <p:txBody>
-          <a:bodyPr/>
-          <a:lstStyle/>
-          <a:p>
-            <a:endParaRPr lang="en-US" dirty="0"/>
-          </a:p>
-        </p:txBody>
-      </p:sp>
+        </p:nvPicPr>
+        <p:blipFill>
+          <a:blip r:embed="rId2"/>
+          <a:stretch>
+            <a:fillRect/>
+          </a:stretch>
+        </p:blipFill>
+        <p:spPr>
+          <a:xfrm>
+            <a:off x="1053107" y="2505075"/>
+            <a:ext cx="4731149" cy="3684588"/>
+          </a:xfrm>
+        </p:spPr>
+      </p:pic>
       <p:sp>
         <p:nvSpPr>
           <p:cNvPr id="5" name="Text Placeholder 4">
@@ -3808,31 +3849,35 @@
           </a:p>
         </p:txBody>
       </p:sp>
-      <p:sp>
-        <p:nvSpPr>
-          <p:cNvPr id="6" name="Content Placeholder 5">
-            <a:extLst>
-              <a:ext uri="{FF2B5EF4-FFF2-40B4-BE49-F238E27FC236}">
-                <a16:creationId xmlns:a16="http://schemas.microsoft.com/office/drawing/2014/main" id="{7ADE593C-D093-9A48-BDBD-80A3F5A61868}"/>
-              </a:ext>
-            </a:extLst>
-          </p:cNvPr>
-          <p:cNvSpPr>
-            <a:spLocks noGrp="1"/>
-          </p:cNvSpPr>
+      <p:pic>
+        <p:nvPicPr>
+          <p:cNvPr id="10" name="Content Placeholder 9">
+            <a:extLst>
+              <a:ext uri="{FF2B5EF4-FFF2-40B4-BE49-F238E27FC236}">
+                <a16:creationId xmlns:a16="http://schemas.microsoft.com/office/drawing/2014/main" id="{E889413F-CA12-BF40-BAA8-A3EB78575F8F}"/>
+              </a:ext>
+            </a:extLst>
+          </p:cNvPr>
+          <p:cNvPicPr>
+            <a:picLocks noGrp="1" noChangeAspect="1"/>
+          </p:cNvPicPr>
           <p:nvPr>
             <p:ph sz="quarter" idx="4"/>
           </p:nvPr>
-        </p:nvSpPr>
-        <p:spPr/>
-        <p:txBody>
-          <a:bodyPr/>
-          <a:lstStyle/>
-          <a:p>
-            <a:endParaRPr lang="en-US"/>
-          </a:p>
-        </p:txBody>
-      </p:sp>
+        </p:nvPicPr>
+        <p:blipFill>
+          <a:blip r:embed="rId3"/>
+          <a:stretch>
+            <a:fillRect/>
+          </a:stretch>
+        </p:blipFill>
+        <p:spPr>
+          <a:xfrm>
+            <a:off x="6404290" y="2505075"/>
+            <a:ext cx="4719008" cy="3684588"/>
+          </a:xfrm>
+        </p:spPr>
+      </p:pic>
     </p:spTree>
     <p:extLst>
       <p:ext uri="{BB962C8B-B14F-4D97-AF65-F5344CB8AC3E}">
@@ -3907,12 +3952,417 @@
             <p:ph idx="1"/>
           </p:nvPr>
         </p:nvSpPr>
-        <p:spPr/>
-        <p:txBody>
-          <a:bodyPr/>
-          <a:lstStyle/>
-          <a:p>
-            <a:endParaRPr lang="en-US"/>
+        <p:spPr>
+          <a:xfrm>
+            <a:off x="838200" y="1825625"/>
+            <a:ext cx="4676775" cy="474663"/>
+          </a:xfrm>
+        </p:spPr>
+        <p:txBody>
+          <a:bodyPr>
+            <a:normAutofit lnSpcReduction="10000"/>
+          </a:bodyPr>
+          <a:lstStyle/>
+          <a:p>
+            <a:r>
+              <a:rPr lang="en-US" dirty="0" err="1"/>
+              <a:t>In_basket</a:t>
+            </a:r>
+            <a:r>
+              <a:rPr lang="en-US" dirty="0"/>
+              <a:t> function worked:</a:t>
+            </a:r>
+          </a:p>
+        </p:txBody>
+      </p:sp>
+      <p:pic>
+        <p:nvPicPr>
+          <p:cNvPr id="5" name="Picture 4">
+            <a:extLst>
+              <a:ext uri="{FF2B5EF4-FFF2-40B4-BE49-F238E27FC236}">
+                <a16:creationId xmlns:a16="http://schemas.microsoft.com/office/drawing/2014/main" id="{578E71E8-33BA-3C45-931D-3979A3311FC6}"/>
+              </a:ext>
+            </a:extLst>
+          </p:cNvPr>
+          <p:cNvPicPr>
+            <a:picLocks noChangeAspect="1"/>
+          </p:cNvPicPr>
+          <p:nvPr/>
+        </p:nvPicPr>
+        <p:blipFill>
+          <a:blip r:embed="rId2"/>
+          <a:stretch>
+            <a:fillRect/>
+          </a:stretch>
+        </p:blipFill>
+        <p:spPr>
+          <a:xfrm>
+            <a:off x="8100354" y="2571750"/>
+            <a:ext cx="3843996" cy="3062288"/>
+          </a:xfrm>
+          <a:prstGeom prst="rect">
+            <a:avLst/>
+          </a:prstGeom>
+        </p:spPr>
+      </p:pic>
+      <p:sp>
+        <p:nvSpPr>
+          <p:cNvPr id="6" name="TextBox 5">
+            <a:extLst>
+              <a:ext uri="{FF2B5EF4-FFF2-40B4-BE49-F238E27FC236}">
+                <a16:creationId xmlns:a16="http://schemas.microsoft.com/office/drawing/2014/main" id="{A3D03AAC-E2E1-5A4B-B3CF-FCAD8D9E00CF}"/>
+              </a:ext>
+            </a:extLst>
+          </p:cNvPr>
+          <p:cNvSpPr txBox="1"/>
+          <p:nvPr/>
+        </p:nvSpPr>
+        <p:spPr>
+          <a:xfrm>
+            <a:off x="8100353" y="5846544"/>
+            <a:ext cx="3843997" cy="646331"/>
+          </a:xfrm>
+          <a:prstGeom prst="rect">
+            <a:avLst/>
+          </a:prstGeom>
+          <a:noFill/>
+        </p:spPr>
+        <p:txBody>
+          <a:bodyPr wrap="square" rtlCol="0">
+            <a:spAutoFit/>
+          </a:bodyPr>
+          <a:lstStyle/>
+          <a:p>
+            <a:r>
+              <a:rPr lang="en-US" dirty="0" err="1"/>
+              <a:t>Start_height</a:t>
+            </a:r>
+            <a:r>
+              <a:rPr lang="en-US" dirty="0"/>
+              <a:t> = 1.8; v0 = 10; angle = 80; </a:t>
+            </a:r>
+            <a:r>
+              <a:rPr lang="en-US" dirty="0" err="1"/>
+              <a:t>distance_backboard</a:t>
+            </a:r>
+            <a:r>
+              <a:rPr lang="en-US" dirty="0"/>
+              <a:t> = 2.5</a:t>
+            </a:r>
+          </a:p>
+        </p:txBody>
+      </p:sp>
+      <p:sp>
+        <p:nvSpPr>
+          <p:cNvPr id="7" name="TextBox 6">
+            <a:extLst>
+              <a:ext uri="{FF2B5EF4-FFF2-40B4-BE49-F238E27FC236}">
+                <a16:creationId xmlns:a16="http://schemas.microsoft.com/office/drawing/2014/main" id="{F3300CB6-AF3C-6841-9775-3E3CA08B2641}"/>
+              </a:ext>
+            </a:extLst>
+          </p:cNvPr>
+          <p:cNvSpPr txBox="1"/>
+          <p:nvPr/>
+        </p:nvSpPr>
+        <p:spPr>
+          <a:xfrm>
+            <a:off x="8032480" y="952024"/>
+            <a:ext cx="3434329" cy="1477328"/>
+          </a:xfrm>
+          <a:prstGeom prst="rect">
+            <a:avLst/>
+          </a:prstGeom>
+          <a:noFill/>
+        </p:spPr>
+        <p:txBody>
+          <a:bodyPr wrap="square" rtlCol="0">
+            <a:spAutoFit/>
+          </a:bodyPr>
+          <a:lstStyle/>
+          <a:p>
+            <a:r>
+              <a:rPr lang="en-US" dirty="0"/>
+              <a:t>*even though it goes through the “hoop”, it goes through so close to the edge that only the </a:t>
+            </a:r>
+            <a:r>
+              <a:rPr lang="en-US" dirty="0" err="1"/>
+              <a:t>centre</a:t>
+            </a:r>
+            <a:r>
+              <a:rPr lang="en-US" dirty="0"/>
+              <a:t> of the ball would go through the hoop, not the whole diameter</a:t>
+            </a:r>
+          </a:p>
+        </p:txBody>
+      </p:sp>
+      <p:pic>
+        <p:nvPicPr>
+          <p:cNvPr id="9" name="Picture 8">
+            <a:extLst>
+              <a:ext uri="{FF2B5EF4-FFF2-40B4-BE49-F238E27FC236}">
+                <a16:creationId xmlns:a16="http://schemas.microsoft.com/office/drawing/2014/main" id="{E2ADDD55-4830-7642-869F-C183F295E0EA}"/>
+              </a:ext>
+            </a:extLst>
+          </p:cNvPr>
+          <p:cNvPicPr>
+            <a:picLocks noChangeAspect="1"/>
+          </p:cNvPicPr>
+          <p:nvPr/>
+        </p:nvPicPr>
+        <p:blipFill>
+          <a:blip r:embed="rId3"/>
+          <a:stretch>
+            <a:fillRect/>
+          </a:stretch>
+        </p:blipFill>
+        <p:spPr>
+          <a:xfrm>
+            <a:off x="247650" y="2571750"/>
+            <a:ext cx="3847675" cy="3062288"/>
+          </a:xfrm>
+          <a:prstGeom prst="rect">
+            <a:avLst/>
+          </a:prstGeom>
+        </p:spPr>
+      </p:pic>
+      <p:sp>
+        <p:nvSpPr>
+          <p:cNvPr id="10" name="TextBox 9">
+            <a:extLst>
+              <a:ext uri="{FF2B5EF4-FFF2-40B4-BE49-F238E27FC236}">
+                <a16:creationId xmlns:a16="http://schemas.microsoft.com/office/drawing/2014/main" id="{E6E80989-0C51-384F-B849-FC2EF851CA24}"/>
+              </a:ext>
+            </a:extLst>
+          </p:cNvPr>
+          <p:cNvSpPr txBox="1"/>
+          <p:nvPr/>
+        </p:nvSpPr>
+        <p:spPr>
+          <a:xfrm>
+            <a:off x="249488" y="5846543"/>
+            <a:ext cx="3843997" cy="646331"/>
+          </a:xfrm>
+          <a:prstGeom prst="rect">
+            <a:avLst/>
+          </a:prstGeom>
+          <a:noFill/>
+        </p:spPr>
+        <p:txBody>
+          <a:bodyPr wrap="square" rtlCol="0">
+            <a:spAutoFit/>
+          </a:bodyPr>
+          <a:lstStyle/>
+          <a:p>
+            <a:r>
+              <a:rPr lang="en-US" dirty="0" err="1"/>
+              <a:t>Start_height</a:t>
+            </a:r>
+            <a:r>
+              <a:rPr lang="en-US" dirty="0"/>
+              <a:t> = 1.8; v0 = 9.8; angle = 80; </a:t>
+            </a:r>
+            <a:r>
+              <a:rPr lang="en-US" dirty="0" err="1"/>
+              <a:t>distance_backboard</a:t>
+            </a:r>
+            <a:r>
+              <a:rPr lang="en-US" dirty="0"/>
+              <a:t> = 2.5</a:t>
+            </a:r>
+          </a:p>
+        </p:txBody>
+      </p:sp>
+      <p:pic>
+        <p:nvPicPr>
+          <p:cNvPr id="12" name="Picture 11">
+            <a:extLst>
+              <a:ext uri="{FF2B5EF4-FFF2-40B4-BE49-F238E27FC236}">
+                <a16:creationId xmlns:a16="http://schemas.microsoft.com/office/drawing/2014/main" id="{93DE4117-5C64-E140-85DD-30827179B01E}"/>
+              </a:ext>
+            </a:extLst>
+          </p:cNvPr>
+          <p:cNvPicPr>
+            <a:picLocks noChangeAspect="1"/>
+          </p:cNvPicPr>
+          <p:nvPr/>
+        </p:nvPicPr>
+        <p:blipFill>
+          <a:blip r:embed="rId4"/>
+          <a:stretch>
+            <a:fillRect/>
+          </a:stretch>
+        </p:blipFill>
+        <p:spPr>
+          <a:xfrm>
+            <a:off x="4158390" y="2606804"/>
+            <a:ext cx="3878898" cy="3062288"/>
+          </a:xfrm>
+          <a:prstGeom prst="rect">
+            <a:avLst/>
+          </a:prstGeom>
+        </p:spPr>
+      </p:pic>
+      <p:sp>
+        <p:nvSpPr>
+          <p:cNvPr id="13" name="TextBox 12">
+            <a:extLst>
+              <a:ext uri="{FF2B5EF4-FFF2-40B4-BE49-F238E27FC236}">
+                <a16:creationId xmlns:a16="http://schemas.microsoft.com/office/drawing/2014/main" id="{030465CC-B60E-0C46-9C42-79B9EC21CA92}"/>
+              </a:ext>
+            </a:extLst>
+          </p:cNvPr>
+          <p:cNvSpPr txBox="1"/>
+          <p:nvPr/>
+        </p:nvSpPr>
+        <p:spPr>
+          <a:xfrm>
+            <a:off x="4256356" y="5846544"/>
+            <a:ext cx="3843997" cy="646331"/>
+          </a:xfrm>
+          <a:prstGeom prst="rect">
+            <a:avLst/>
+          </a:prstGeom>
+          <a:noFill/>
+        </p:spPr>
+        <p:txBody>
+          <a:bodyPr wrap="square" rtlCol="0">
+            <a:spAutoFit/>
+          </a:bodyPr>
+          <a:lstStyle/>
+          <a:p>
+            <a:r>
+              <a:rPr lang="en-US" dirty="0" err="1"/>
+              <a:t>Start_height</a:t>
+            </a:r>
+            <a:r>
+              <a:rPr lang="en-US" dirty="0"/>
+              <a:t> = 1.8; v0 = 9.8; angle = 60; </a:t>
+            </a:r>
+            <a:r>
+              <a:rPr lang="en-US" dirty="0" err="1"/>
+              <a:t>distance_backboard</a:t>
+            </a:r>
+            <a:r>
+              <a:rPr lang="en-US" dirty="0"/>
+              <a:t> = 7</a:t>
+            </a:r>
+          </a:p>
+        </p:txBody>
+      </p:sp>
+      <p:sp>
+        <p:nvSpPr>
+          <p:cNvPr id="14" name="TextBox 13">
+            <a:extLst>
+              <a:ext uri="{FF2B5EF4-FFF2-40B4-BE49-F238E27FC236}">
+                <a16:creationId xmlns:a16="http://schemas.microsoft.com/office/drawing/2014/main" id="{08CC52B2-72C1-7542-9AA8-1D16A478A04C}"/>
+              </a:ext>
+            </a:extLst>
+          </p:cNvPr>
+          <p:cNvSpPr txBox="1"/>
+          <p:nvPr/>
+        </p:nvSpPr>
+        <p:spPr>
+          <a:xfrm>
+            <a:off x="497401" y="2812018"/>
+            <a:ext cx="681597" cy="369332"/>
+          </a:xfrm>
+          <a:prstGeom prst="rect">
+            <a:avLst/>
+          </a:prstGeom>
+          <a:noFill/>
+        </p:spPr>
+        <p:txBody>
+          <a:bodyPr wrap="none" rtlCol="0">
+            <a:spAutoFit/>
+          </a:bodyPr>
+          <a:lstStyle/>
+          <a:p>
+            <a:r>
+              <a:rPr lang="en-US" dirty="0">
+                <a:highlight>
+                  <a:srgbClr val="FFFF00"/>
+                </a:highlight>
+              </a:rPr>
+              <a:t>TRUE</a:t>
+            </a:r>
+          </a:p>
+        </p:txBody>
+      </p:sp>
+      <p:sp>
+        <p:nvSpPr>
+          <p:cNvPr id="15" name="TextBox 14">
+            <a:extLst>
+              <a:ext uri="{FF2B5EF4-FFF2-40B4-BE49-F238E27FC236}">
+                <a16:creationId xmlns:a16="http://schemas.microsoft.com/office/drawing/2014/main" id="{BDBC0E2E-56CF-4C40-A694-5FEEEE0F2EDB}"/>
+              </a:ext>
+            </a:extLst>
+          </p:cNvPr>
+          <p:cNvSpPr txBox="1"/>
+          <p:nvPr/>
+        </p:nvSpPr>
+        <p:spPr>
+          <a:xfrm>
+            <a:off x="4409649" y="2812018"/>
+            <a:ext cx="681597" cy="369332"/>
+          </a:xfrm>
+          <a:prstGeom prst="rect">
+            <a:avLst/>
+          </a:prstGeom>
+          <a:noFill/>
+        </p:spPr>
+        <p:txBody>
+          <a:bodyPr wrap="none" rtlCol="0">
+            <a:spAutoFit/>
+          </a:bodyPr>
+          <a:lstStyle/>
+          <a:p>
+            <a:r>
+              <a:rPr lang="en-US" dirty="0">
+                <a:highlight>
+                  <a:srgbClr val="FFFF00"/>
+                </a:highlight>
+              </a:rPr>
+              <a:t>TRUE</a:t>
+            </a:r>
+          </a:p>
+        </p:txBody>
+      </p:sp>
+      <p:sp>
+        <p:nvSpPr>
+          <p:cNvPr id="16" name="TextBox 15">
+            <a:extLst>
+              <a:ext uri="{FF2B5EF4-FFF2-40B4-BE49-F238E27FC236}">
+                <a16:creationId xmlns:a16="http://schemas.microsoft.com/office/drawing/2014/main" id="{E7ACEBB2-A2B3-0047-BD38-949B7D814682}"/>
+              </a:ext>
+            </a:extLst>
+          </p:cNvPr>
+          <p:cNvSpPr txBox="1"/>
+          <p:nvPr/>
+        </p:nvSpPr>
+        <p:spPr>
+          <a:xfrm>
+            <a:off x="8369922" y="2812018"/>
+            <a:ext cx="726353" cy="369332"/>
+          </a:xfrm>
+          <a:prstGeom prst="rect">
+            <a:avLst/>
+          </a:prstGeom>
+          <a:noFill/>
+        </p:spPr>
+        <p:txBody>
+          <a:bodyPr wrap="none" rtlCol="0">
+            <a:spAutoFit/>
+          </a:bodyPr>
+          <a:lstStyle/>
+          <a:p>
+            <a:r>
+              <a:rPr lang="en-US" dirty="0">
+                <a:highlight>
+                  <a:srgbClr val="FFFF00"/>
+                </a:highlight>
+              </a:rPr>
+              <a:t>FALSE</a:t>
+            </a:r>
           </a:p>
         </p:txBody>
       </p:sp>
@@ -3990,12 +4440,36 @@
             <p:ph idx="1"/>
           </p:nvPr>
         </p:nvSpPr>
-        <p:spPr/>
-        <p:txBody>
-          <a:bodyPr/>
-          <a:lstStyle/>
-          <a:p>
-            <a:endParaRPr lang="en-US"/>
+        <p:spPr>
+          <a:xfrm>
+            <a:off x="838199" y="1825625"/>
+            <a:ext cx="10515599" cy="4351338"/>
+          </a:xfrm>
+        </p:spPr>
+        <p:txBody>
+          <a:bodyPr>
+            <a:normAutofit/>
+          </a:bodyPr>
+          <a:lstStyle/>
+          <a:p>
+            <a:r>
+              <a:rPr lang="en-US" dirty="0"/>
+              <a:t>Plotting in 3D – I had an import problem</a:t>
+            </a:r>
+          </a:p>
+          <a:p>
+            <a:r>
+              <a:rPr lang="en-US" dirty="0"/>
+              <a:t>Something must be wrong with my 3D code – trying to run the </a:t>
+            </a:r>
+            <a:r>
+              <a:rPr lang="en-US" dirty="0" err="1"/>
+              <a:t>in_basket</a:t>
+            </a:r>
+            <a:r>
+              <a:rPr lang="en-US" dirty="0"/>
+              <a:t> function with an x value of 0 and the working values I had before (to imitate a 2D problem) and for the first one it says no backboard and that it doesn’t go in the hoop</a:t>
+            </a:r>
           </a:p>
         </p:txBody>
       </p:sp>
@@ -4073,18 +4547,53 @@
             <p:ph idx="1"/>
           </p:nvPr>
         </p:nvSpPr>
-        <p:spPr/>
+        <p:spPr>
+          <a:xfrm>
+            <a:off x="838200" y="1825625"/>
+            <a:ext cx="5257800" cy="4351338"/>
+          </a:xfrm>
+        </p:spPr>
         <p:txBody>
           <a:bodyPr/>
           <a:lstStyle/>
           <a:p>
             <a:r>
               <a:rPr lang="en-US" dirty="0"/>
-              <a:t>Regardless of my initial angle, velocity or distance from the backboard, the shot off the backboard goes back to the origin, which doesn’t seem right.</a:t>
-            </a:r>
-          </a:p>
-        </p:txBody>
-      </p:sp>
+              <a:t>How should I handle the rim of the hoop? It’s possible for the basketball to hit the rim and not bounce into the basket. If it hits the rim and bounces in, should I assume an elastic collision? I couldn’t find any info on the amount of energy lost when the basketball hits the rim.</a:t>
+            </a:r>
+          </a:p>
+        </p:txBody>
+      </p:sp>
+      <p:pic>
+        <p:nvPicPr>
+          <p:cNvPr id="8" name="Picture 7" descr="Birds eye view of basketball hoop">
+            <a:extLst>
+              <a:ext uri="{FF2B5EF4-FFF2-40B4-BE49-F238E27FC236}">
+                <a16:creationId xmlns:a16="http://schemas.microsoft.com/office/drawing/2014/main" id="{1EBC0ED4-0764-064D-9B71-1B723AF849F0}"/>
+              </a:ext>
+            </a:extLst>
+          </p:cNvPr>
+          <p:cNvPicPr>
+            <a:picLocks noChangeAspect="1"/>
+          </p:cNvPicPr>
+          <p:nvPr/>
+        </p:nvPicPr>
+        <p:blipFill>
+          <a:blip r:embed="rId2"/>
+          <a:stretch>
+            <a:fillRect/>
+          </a:stretch>
+        </p:blipFill>
+        <p:spPr>
+          <a:xfrm>
+            <a:off x="6287047" y="845344"/>
+            <a:ext cx="5404890" cy="5167312"/>
+          </a:xfrm>
+          <a:prstGeom prst="rect">
+            <a:avLst/>
+          </a:prstGeom>
+        </p:spPr>
+      </p:pic>
     </p:spTree>
     <p:extLst>
       <p:ext uri="{BB962C8B-B14F-4D97-AF65-F5344CB8AC3E}">
@@ -4164,7 +4673,27 @@
           <a:bodyPr/>
           <a:lstStyle/>
           <a:p>
-            <a:endParaRPr lang="en-US"/>
+            <a:r>
+              <a:rPr lang="en-US" dirty="0"/>
+              <a:t>Get 3D code fully working</a:t>
+            </a:r>
+          </a:p>
+          <a:p>
+            <a:r>
+              <a:rPr lang="en-US" dirty="0"/>
+              <a:t>Figure out energy lost for backboard and rim</a:t>
+            </a:r>
+          </a:p>
+          <a:p>
+            <a:r>
+              <a:rPr lang="en-US" dirty="0"/>
+              <a:t>Start thinking about how I’ll run the Monte </a:t>
+            </a:r>
+            <a:r>
+              <a:rPr lang="en-US"/>
+              <a:t>Carlo simulation</a:t>
+            </a:r>
+            <a:endParaRPr lang="en-US" dirty="0"/>
           </a:p>
         </p:txBody>
       </p:sp>
@@ -4247,7 +4776,20 @@
           <a:bodyPr/>
           <a:lstStyle/>
           <a:p>
-            <a:endParaRPr lang="en-US"/>
+            <a:r>
+              <a:rPr lang="en-US" dirty="0"/>
+              <a:t>HOOP DIMENSIONS - </a:t>
+            </a:r>
+            <a:r>
+              <a:rPr lang="en-US" dirty="0">
+                <a:hlinkClick r:id="rId2"/>
+              </a:rPr>
+              <a:t>https://www.researchgate.net/figure/Basketball-hoop-inner-diameter-045-m-hoop-piping-diameter-002-m-and-distance-015_fig3_274248017</a:t>
+            </a:r>
+            <a:endParaRPr lang="en-US" dirty="0"/>
+          </a:p>
+          <a:p>
+            <a:endParaRPr lang="en-US" dirty="0"/>
           </a:p>
         </p:txBody>
       </p:sp>

</xml_diff>

<commit_message>
Got 3d-shot.py working in 2D (for the most part)
</commit_message>
<xml_diff>
--- a/Weekly Presentations/Week 2.pptx
+++ b/Weekly Presentations/Week 2.pptx
@@ -11,9 +11,10 @@
     <p:sldId id="264" r:id="rId5"/>
     <p:sldId id="258" r:id="rId6"/>
     <p:sldId id="259" r:id="rId7"/>
-    <p:sldId id="260" r:id="rId8"/>
-    <p:sldId id="261" r:id="rId9"/>
-    <p:sldId id="262" r:id="rId10"/>
+    <p:sldId id="265" r:id="rId8"/>
+    <p:sldId id="260" r:id="rId9"/>
+    <p:sldId id="261" r:id="rId10"/>
+    <p:sldId id="262" r:id="rId11"/>
   </p:sldIdLst>
   <p:sldSz cx="12192000" cy="6858000"/>
   <p:notesSz cx="6858000" cy="9144000"/>
@@ -269,7 +270,7 @@
           <a:p>
             <a:fld id="{24254BC8-D0F6-E94B-96BF-332F436FCAF8}" type="datetimeFigureOut">
               <a:rPr lang="en-US" smtClean="0"/>
-              <a:t>8/31/20</a:t>
+              <a:t>9/2/20</a:t>
             </a:fld>
             <a:endParaRPr lang="en-US"/>
           </a:p>
@@ -469,7 +470,7 @@
           <a:p>
             <a:fld id="{24254BC8-D0F6-E94B-96BF-332F436FCAF8}" type="datetimeFigureOut">
               <a:rPr lang="en-US" smtClean="0"/>
-              <a:t>8/31/20</a:t>
+              <a:t>9/2/20</a:t>
             </a:fld>
             <a:endParaRPr lang="en-US"/>
           </a:p>
@@ -679,7 +680,7 @@
           <a:p>
             <a:fld id="{24254BC8-D0F6-E94B-96BF-332F436FCAF8}" type="datetimeFigureOut">
               <a:rPr lang="en-US" smtClean="0"/>
-              <a:t>8/31/20</a:t>
+              <a:t>9/2/20</a:t>
             </a:fld>
             <a:endParaRPr lang="en-US"/>
           </a:p>
@@ -879,7 +880,7 @@
           <a:p>
             <a:fld id="{24254BC8-D0F6-E94B-96BF-332F436FCAF8}" type="datetimeFigureOut">
               <a:rPr lang="en-US" smtClean="0"/>
-              <a:t>8/31/20</a:t>
+              <a:t>9/2/20</a:t>
             </a:fld>
             <a:endParaRPr lang="en-US"/>
           </a:p>
@@ -1155,7 +1156,7 @@
           <a:p>
             <a:fld id="{24254BC8-D0F6-E94B-96BF-332F436FCAF8}" type="datetimeFigureOut">
               <a:rPr lang="en-US" smtClean="0"/>
-              <a:t>8/31/20</a:t>
+              <a:t>9/2/20</a:t>
             </a:fld>
             <a:endParaRPr lang="en-US"/>
           </a:p>
@@ -1423,7 +1424,7 @@
           <a:p>
             <a:fld id="{24254BC8-D0F6-E94B-96BF-332F436FCAF8}" type="datetimeFigureOut">
               <a:rPr lang="en-US" smtClean="0"/>
-              <a:t>8/31/20</a:t>
+              <a:t>9/2/20</a:t>
             </a:fld>
             <a:endParaRPr lang="en-US"/>
           </a:p>
@@ -1838,7 +1839,7 @@
           <a:p>
             <a:fld id="{24254BC8-D0F6-E94B-96BF-332F436FCAF8}" type="datetimeFigureOut">
               <a:rPr lang="en-US" smtClean="0"/>
-              <a:t>8/31/20</a:t>
+              <a:t>9/2/20</a:t>
             </a:fld>
             <a:endParaRPr lang="en-US"/>
           </a:p>
@@ -1980,7 +1981,7 @@
           <a:p>
             <a:fld id="{24254BC8-D0F6-E94B-96BF-332F436FCAF8}" type="datetimeFigureOut">
               <a:rPr lang="en-US" smtClean="0"/>
-              <a:t>8/31/20</a:t>
+              <a:t>9/2/20</a:t>
             </a:fld>
             <a:endParaRPr lang="en-US"/>
           </a:p>
@@ -2093,7 +2094,7 @@
           <a:p>
             <a:fld id="{24254BC8-D0F6-E94B-96BF-332F436FCAF8}" type="datetimeFigureOut">
               <a:rPr lang="en-US" smtClean="0"/>
-              <a:t>8/31/20</a:t>
+              <a:t>9/2/20</a:t>
             </a:fld>
             <a:endParaRPr lang="en-US"/>
           </a:p>
@@ -2406,7 +2407,7 @@
           <a:p>
             <a:fld id="{24254BC8-D0F6-E94B-96BF-332F436FCAF8}" type="datetimeFigureOut">
               <a:rPr lang="en-US" smtClean="0"/>
-              <a:t>8/31/20</a:t>
+              <a:t>9/2/20</a:t>
             </a:fld>
             <a:endParaRPr lang="en-US"/>
           </a:p>
@@ -2695,7 +2696,7 @@
           <a:p>
             <a:fld id="{24254BC8-D0F6-E94B-96BF-332F436FCAF8}" type="datetimeFigureOut">
               <a:rPr lang="en-US" smtClean="0"/>
-              <a:t>8/31/20</a:t>
+              <a:t>9/2/20</a:t>
             </a:fld>
             <a:endParaRPr lang="en-US"/>
           </a:p>
@@ -2938,7 +2939,7 @@
           <a:p>
             <a:fld id="{24254BC8-D0F6-E94B-96BF-332F436FCAF8}" type="datetimeFigureOut">
               <a:rPr lang="en-US" smtClean="0"/>
-              <a:t>8/31/20</a:t>
+              <a:t>9/2/20</a:t>
             </a:fld>
             <a:endParaRPr lang="en-US"/>
           </a:p>
@@ -3424,6 +3425,102 @@
 </p:sld>
 </file>
 
+<file path=ppt/slides/slide10.xml><?xml version="1.0" encoding="utf-8"?>
+<p:sld xmlns:a="http://schemas.openxmlformats.org/drawingml/2006/main" xmlns:r="http://schemas.openxmlformats.org/officeDocument/2006/relationships" xmlns:p="http://schemas.openxmlformats.org/presentationml/2006/main">
+  <p:cSld>
+    <p:spTree>
+      <p:nvGrpSpPr>
+        <p:cNvPr id="1" name=""/>
+        <p:cNvGrpSpPr/>
+        <p:nvPr/>
+      </p:nvGrpSpPr>
+      <p:grpSpPr>
+        <a:xfrm>
+          <a:off x="0" y="0"/>
+          <a:ext cx="0" cy="0"/>
+          <a:chOff x="0" y="0"/>
+          <a:chExt cx="0" cy="0"/>
+        </a:xfrm>
+      </p:grpSpPr>
+      <p:sp>
+        <p:nvSpPr>
+          <p:cNvPr id="2" name="Title 1">
+            <a:extLst>
+              <a:ext uri="{FF2B5EF4-FFF2-40B4-BE49-F238E27FC236}">
+                <a16:creationId xmlns:a16="http://schemas.microsoft.com/office/drawing/2014/main" id="{02AC1237-E82F-FC48-9007-B5579512BC73}"/>
+              </a:ext>
+            </a:extLst>
+          </p:cNvPr>
+          <p:cNvSpPr>
+            <a:spLocks noGrp="1"/>
+          </p:cNvSpPr>
+          <p:nvPr>
+            <p:ph type="title"/>
+          </p:nvPr>
+        </p:nvSpPr>
+        <p:spPr/>
+        <p:txBody>
+          <a:bodyPr/>
+          <a:lstStyle/>
+          <a:p>
+            <a:r>
+              <a:rPr lang="en-US" dirty="0"/>
+              <a:t>Sources</a:t>
+            </a:r>
+          </a:p>
+        </p:txBody>
+      </p:sp>
+      <p:sp>
+        <p:nvSpPr>
+          <p:cNvPr id="3" name="Content Placeholder 2">
+            <a:extLst>
+              <a:ext uri="{FF2B5EF4-FFF2-40B4-BE49-F238E27FC236}">
+                <a16:creationId xmlns:a16="http://schemas.microsoft.com/office/drawing/2014/main" id="{486F7149-BE39-F745-8982-F5CCE215A810}"/>
+              </a:ext>
+            </a:extLst>
+          </p:cNvPr>
+          <p:cNvSpPr>
+            <a:spLocks noGrp="1"/>
+          </p:cNvSpPr>
+          <p:nvPr>
+            <p:ph idx="1"/>
+          </p:nvPr>
+        </p:nvSpPr>
+        <p:spPr/>
+        <p:txBody>
+          <a:bodyPr/>
+          <a:lstStyle/>
+          <a:p>
+            <a:r>
+              <a:rPr lang="en-US" dirty="0"/>
+              <a:t>HOOP DIMENSIONS - </a:t>
+            </a:r>
+            <a:r>
+              <a:rPr lang="en-US" dirty="0">
+                <a:hlinkClick r:id="rId2"/>
+              </a:rPr>
+              <a:t>https://www.researchgate.net/figure/Basketball-hoop-inner-diameter-045-m-hoop-piping-diameter-002-m-and-distance-015_fig3_274248017</a:t>
+            </a:r>
+            <a:endParaRPr lang="en-US" dirty="0"/>
+          </a:p>
+          <a:p>
+            <a:endParaRPr lang="en-US" dirty="0"/>
+          </a:p>
+        </p:txBody>
+      </p:sp>
+    </p:spTree>
+    <p:extLst>
+      <p:ext uri="{BB962C8B-B14F-4D97-AF65-F5344CB8AC3E}">
+        <p14:creationId xmlns:p14="http://schemas.microsoft.com/office/powerpoint/2010/main" val="2633732305"/>
+      </p:ext>
+    </p:extLst>
+  </p:cSld>
+  <p:clrMapOvr>
+    <a:masterClrMapping/>
+  </p:clrMapOvr>
+</p:sld>
+</file>
+
 <file path=ppt/slides/slide2.xml><?xml version="1.0" encoding="utf-8"?>
 <p:sld xmlns:a="http://schemas.openxmlformats.org/drawingml/2006/main" xmlns:r="http://schemas.openxmlformats.org/officeDocument/2006/relationships" xmlns:p="http://schemas.openxmlformats.org/presentationml/2006/main">
   <p:cSld>
@@ -4117,7 +4214,7 @@
         </p:blipFill>
         <p:spPr>
           <a:xfrm>
-            <a:off x="247650" y="2571750"/>
+            <a:off x="247650" y="2606804"/>
             <a:ext cx="3847675" cy="3062288"/>
           </a:xfrm>
           <a:prstGeom prst="rect">
@@ -4443,7 +4540,7 @@
         <p:spPr>
           <a:xfrm>
             <a:off x="838199" y="1825625"/>
-            <a:ext cx="10515599" cy="4351338"/>
+            <a:ext cx="5257801" cy="4351338"/>
           </a:xfrm>
         </p:spPr>
         <p:txBody>
@@ -4455,20 +4552,6 @@
             <a:r>
               <a:rPr lang="en-US" dirty="0"/>
               <a:t>Plotting in 3D – I had an import problem</a:t>
-            </a:r>
-          </a:p>
-          <a:p>
-            <a:r>
-              <a:rPr lang="en-US" dirty="0"/>
-              <a:t>Something must be wrong with my 3D code – trying to run the </a:t>
-            </a:r>
-            <a:r>
-              <a:rPr lang="en-US" dirty="0" err="1"/>
-              <a:t>in_basket</a:t>
-            </a:r>
-            <a:r>
-              <a:rPr lang="en-US" dirty="0"/>
-              <a:t> function with an x value of 0 and the working values I had before (to imitate a 2D problem) and for the first one it says no backboard and that it doesn’t go in the hoop</a:t>
             </a:r>
           </a:p>
         </p:txBody>
@@ -4508,6 +4591,247 @@
           <p:cNvPr id="2" name="Title 1">
             <a:extLst>
               <a:ext uri="{FF2B5EF4-FFF2-40B4-BE49-F238E27FC236}">
+                <a16:creationId xmlns:a16="http://schemas.microsoft.com/office/drawing/2014/main" id="{CF0EC7FC-8417-CB43-A183-D82609609ED1}"/>
+              </a:ext>
+            </a:extLst>
+          </p:cNvPr>
+          <p:cNvSpPr>
+            <a:spLocks noGrp="1"/>
+          </p:cNvSpPr>
+          <p:nvPr>
+            <p:ph type="title"/>
+          </p:nvPr>
+        </p:nvSpPr>
+        <p:spPr/>
+        <p:txBody>
+          <a:bodyPr/>
+          <a:lstStyle/>
+          <a:p>
+            <a:r>
+              <a:rPr lang="en-US" dirty="0"/>
+              <a:t>What Didn’t Work</a:t>
+            </a:r>
+          </a:p>
+        </p:txBody>
+      </p:sp>
+      <p:sp>
+        <p:nvSpPr>
+          <p:cNvPr id="3" name="Content Placeholder 2">
+            <a:extLst>
+              <a:ext uri="{FF2B5EF4-FFF2-40B4-BE49-F238E27FC236}">
+                <a16:creationId xmlns:a16="http://schemas.microsoft.com/office/drawing/2014/main" id="{4B7931FC-2D28-6F48-A560-7AC4C09F2532}"/>
+              </a:ext>
+            </a:extLst>
+          </p:cNvPr>
+          <p:cNvSpPr>
+            <a:spLocks noGrp="1"/>
+          </p:cNvSpPr>
+          <p:nvPr>
+            <p:ph idx="1"/>
+          </p:nvPr>
+        </p:nvSpPr>
+        <p:spPr>
+          <a:xfrm>
+            <a:off x="838200" y="1825625"/>
+            <a:ext cx="10389243" cy="848127"/>
+          </a:xfrm>
+        </p:spPr>
+        <p:txBody>
+          <a:bodyPr>
+            <a:normAutofit lnSpcReduction="10000"/>
+          </a:bodyPr>
+          <a:lstStyle/>
+          <a:p>
+            <a:r>
+              <a:rPr lang="en-US" dirty="0"/>
+              <a:t>Sometimes when I limited the 3D plotting to 2D it would work but other times it wouldn’t</a:t>
+            </a:r>
+          </a:p>
+        </p:txBody>
+      </p:sp>
+      <p:pic>
+        <p:nvPicPr>
+          <p:cNvPr id="5" name="Picture 4">
+            <a:extLst>
+              <a:ext uri="{FF2B5EF4-FFF2-40B4-BE49-F238E27FC236}">
+                <a16:creationId xmlns:a16="http://schemas.microsoft.com/office/drawing/2014/main" id="{44B4FE88-1F0F-F947-8E87-0D53CAE89826}"/>
+              </a:ext>
+            </a:extLst>
+          </p:cNvPr>
+          <p:cNvPicPr>
+            <a:picLocks noChangeAspect="1"/>
+          </p:cNvPicPr>
+          <p:nvPr/>
+        </p:nvPicPr>
+        <p:blipFill>
+          <a:blip r:embed="rId2"/>
+          <a:stretch>
+            <a:fillRect/>
+          </a:stretch>
+        </p:blipFill>
+        <p:spPr>
+          <a:xfrm>
+            <a:off x="809408" y="2673752"/>
+            <a:ext cx="4296991" cy="3396518"/>
+          </a:xfrm>
+          <a:prstGeom prst="rect">
+            <a:avLst/>
+          </a:prstGeom>
+        </p:spPr>
+      </p:pic>
+      <p:sp>
+        <p:nvSpPr>
+          <p:cNvPr id="6" name="TextBox 5">
+            <a:extLst>
+              <a:ext uri="{FF2B5EF4-FFF2-40B4-BE49-F238E27FC236}">
+                <a16:creationId xmlns:a16="http://schemas.microsoft.com/office/drawing/2014/main" id="{41F4AB93-E99D-4142-BABC-91892243AF9D}"/>
+              </a:ext>
+            </a:extLst>
+          </p:cNvPr>
+          <p:cNvSpPr txBox="1"/>
+          <p:nvPr/>
+        </p:nvSpPr>
+        <p:spPr>
+          <a:xfrm>
+            <a:off x="426152" y="6166713"/>
+            <a:ext cx="5063502" cy="646331"/>
+          </a:xfrm>
+          <a:prstGeom prst="rect">
+            <a:avLst/>
+          </a:prstGeom>
+          <a:noFill/>
+        </p:spPr>
+        <p:txBody>
+          <a:bodyPr wrap="none" rtlCol="0">
+            <a:spAutoFit/>
+          </a:bodyPr>
+          <a:lstStyle/>
+          <a:p>
+            <a:r>
+              <a:rPr lang="en-US" dirty="0"/>
+              <a:t>It worked here, for a shot that we know goes in:</a:t>
+            </a:r>
+          </a:p>
+          <a:p>
+            <a:r>
+              <a:rPr lang="en-US" dirty="0" err="1"/>
+              <a:t>Start_height</a:t>
+            </a:r>
+            <a:r>
+              <a:rPr lang="en-US" dirty="0"/>
+              <a:t> = 1.8; v0 = 9.8; angle = 80; </a:t>
+            </a:r>
+            <a:r>
+              <a:rPr lang="en-US" dirty="0" err="1"/>
+              <a:t>start_y</a:t>
+            </a:r>
+            <a:r>
+              <a:rPr lang="en-US" dirty="0"/>
+              <a:t> = 2.5</a:t>
+            </a:r>
+          </a:p>
+        </p:txBody>
+      </p:sp>
+      <p:pic>
+        <p:nvPicPr>
+          <p:cNvPr id="7" name="Picture 6">
+            <a:extLst>
+              <a:ext uri="{FF2B5EF4-FFF2-40B4-BE49-F238E27FC236}">
+                <a16:creationId xmlns:a16="http://schemas.microsoft.com/office/drawing/2014/main" id="{D81534E2-98F1-4B48-ADDB-2C41353BE79E}"/>
+              </a:ext>
+            </a:extLst>
+          </p:cNvPr>
+          <p:cNvPicPr>
+            <a:picLocks noChangeAspect="1"/>
+          </p:cNvPicPr>
+          <p:nvPr/>
+        </p:nvPicPr>
+        <p:blipFill>
+          <a:blip r:embed="rId3"/>
+          <a:stretch>
+            <a:fillRect/>
+          </a:stretch>
+        </p:blipFill>
+        <p:spPr>
+          <a:xfrm>
+            <a:off x="6944109" y="2673752"/>
+            <a:ext cx="4438483" cy="3492961"/>
+          </a:xfrm>
+          <a:prstGeom prst="rect">
+            <a:avLst/>
+          </a:prstGeom>
+        </p:spPr>
+      </p:pic>
+      <p:sp>
+        <p:nvSpPr>
+          <p:cNvPr id="8" name="TextBox 7">
+            <a:extLst>
+              <a:ext uri="{FF2B5EF4-FFF2-40B4-BE49-F238E27FC236}">
+                <a16:creationId xmlns:a16="http://schemas.microsoft.com/office/drawing/2014/main" id="{03AA3D39-CD5C-ED4D-956B-CB4ECA18BF69}"/>
+              </a:ext>
+            </a:extLst>
+          </p:cNvPr>
+          <p:cNvSpPr txBox="1"/>
+          <p:nvPr/>
+        </p:nvSpPr>
+        <p:spPr>
+          <a:xfrm>
+            <a:off x="6096000" y="6166712"/>
+            <a:ext cx="6095035" cy="646331"/>
+          </a:xfrm>
+          <a:prstGeom prst="rect">
+            <a:avLst/>
+          </a:prstGeom>
+          <a:noFill/>
+        </p:spPr>
+        <p:txBody>
+          <a:bodyPr wrap="square" rtlCol="0">
+            <a:spAutoFit/>
+          </a:bodyPr>
+          <a:lstStyle/>
+          <a:p>
+            <a:r>
+              <a:rPr lang="en-US" dirty="0"/>
+              <a:t>But something weird happened here (same initial conditions as the previous shot but a starting y distance of 2 instead of 2.5</a:t>
+            </a:r>
+          </a:p>
+        </p:txBody>
+      </p:sp>
+    </p:spTree>
+    <p:extLst>
+      <p:ext uri="{BB962C8B-B14F-4D97-AF65-F5344CB8AC3E}">
+        <p14:creationId xmlns:p14="http://schemas.microsoft.com/office/powerpoint/2010/main" val="1112084708"/>
+      </p:ext>
+    </p:extLst>
+  </p:cSld>
+  <p:clrMapOvr>
+    <a:masterClrMapping/>
+  </p:clrMapOvr>
+</p:sld>
+</file>
+
+<file path=ppt/slides/slide8.xml><?xml version="1.0" encoding="utf-8"?>
+<p:sld xmlns:a="http://schemas.openxmlformats.org/drawingml/2006/main" xmlns:r="http://schemas.openxmlformats.org/officeDocument/2006/relationships" xmlns:p="http://schemas.openxmlformats.org/presentationml/2006/main">
+  <p:cSld>
+    <p:spTree>
+      <p:nvGrpSpPr>
+        <p:cNvPr id="1" name=""/>
+        <p:cNvGrpSpPr/>
+        <p:nvPr/>
+      </p:nvGrpSpPr>
+      <p:grpSpPr>
+        <a:xfrm>
+          <a:off x="0" y="0"/>
+          <a:ext cx="0" cy="0"/>
+          <a:chOff x="0" y="0"/>
+          <a:chExt cx="0" cy="0"/>
+        </a:xfrm>
+      </p:grpSpPr>
+      <p:sp>
+        <p:nvSpPr>
+          <p:cNvPr id="2" name="Title 1">
+            <a:extLst>
+              <a:ext uri="{FF2B5EF4-FFF2-40B4-BE49-F238E27FC236}">
                 <a16:creationId xmlns:a16="http://schemas.microsoft.com/office/drawing/2014/main" id="{65B26CA2-CAE2-014D-AC26-404C9761934E}"/>
               </a:ext>
             </a:extLst>
@@ -4559,7 +4883,7 @@
           <a:p>
             <a:r>
               <a:rPr lang="en-US" dirty="0"/>
-              <a:t>How should I handle the rim of the hoop? It’s possible for the basketball to hit the rim and not bounce into the basket. If it hits the rim and bounces in, should I assume an elastic collision? I couldn’t find any info on the amount of energy lost when the basketball hits the rim.</a:t>
+              <a:t>How should I handle the rim of the hoop? It’s possible for the basketball to hit the rim and not bounce into the basket. If it hits the rim and bounces in, should I assume an elastic collision? I couldn’t find any info on the amount of energy lost when the basketball hits the rim. </a:t>
             </a:r>
           </a:p>
         </p:txBody>
@@ -4607,109 +4931,6 @@
 </p:sld>
 </file>
 
-<file path=ppt/slides/slide8.xml><?xml version="1.0" encoding="utf-8"?>
-<p:sld xmlns:a="http://schemas.openxmlformats.org/drawingml/2006/main" xmlns:r="http://schemas.openxmlformats.org/officeDocument/2006/relationships" xmlns:p="http://schemas.openxmlformats.org/presentationml/2006/main">
-  <p:cSld>
-    <p:spTree>
-      <p:nvGrpSpPr>
-        <p:cNvPr id="1" name=""/>
-        <p:cNvGrpSpPr/>
-        <p:nvPr/>
-      </p:nvGrpSpPr>
-      <p:grpSpPr>
-        <a:xfrm>
-          <a:off x="0" y="0"/>
-          <a:ext cx="0" cy="0"/>
-          <a:chOff x="0" y="0"/>
-          <a:chExt cx="0" cy="0"/>
-        </a:xfrm>
-      </p:grpSpPr>
-      <p:sp>
-        <p:nvSpPr>
-          <p:cNvPr id="2" name="Title 1">
-            <a:extLst>
-              <a:ext uri="{FF2B5EF4-FFF2-40B4-BE49-F238E27FC236}">
-                <a16:creationId xmlns:a16="http://schemas.microsoft.com/office/drawing/2014/main" id="{B085A5A8-D1F4-B344-BD86-87DD741C2726}"/>
-              </a:ext>
-            </a:extLst>
-          </p:cNvPr>
-          <p:cNvSpPr>
-            <a:spLocks noGrp="1"/>
-          </p:cNvSpPr>
-          <p:nvPr>
-            <p:ph type="title"/>
-          </p:nvPr>
-        </p:nvSpPr>
-        <p:spPr/>
-        <p:txBody>
-          <a:bodyPr/>
-          <a:lstStyle/>
-          <a:p>
-            <a:r>
-              <a:rPr lang="en-US" dirty="0"/>
-              <a:t>What Next?</a:t>
-            </a:r>
-          </a:p>
-        </p:txBody>
-      </p:sp>
-      <p:sp>
-        <p:nvSpPr>
-          <p:cNvPr id="3" name="Content Placeholder 2">
-            <a:extLst>
-              <a:ext uri="{FF2B5EF4-FFF2-40B4-BE49-F238E27FC236}">
-                <a16:creationId xmlns:a16="http://schemas.microsoft.com/office/drawing/2014/main" id="{2DE226DF-2E4B-D24B-8DB8-4BE37B821ED6}"/>
-              </a:ext>
-            </a:extLst>
-          </p:cNvPr>
-          <p:cNvSpPr>
-            <a:spLocks noGrp="1"/>
-          </p:cNvSpPr>
-          <p:nvPr>
-            <p:ph idx="1"/>
-          </p:nvPr>
-        </p:nvSpPr>
-        <p:spPr/>
-        <p:txBody>
-          <a:bodyPr/>
-          <a:lstStyle/>
-          <a:p>
-            <a:r>
-              <a:rPr lang="en-US" dirty="0"/>
-              <a:t>Get 3D code fully working</a:t>
-            </a:r>
-          </a:p>
-          <a:p>
-            <a:r>
-              <a:rPr lang="en-US" dirty="0"/>
-              <a:t>Figure out energy lost for backboard and rim</a:t>
-            </a:r>
-          </a:p>
-          <a:p>
-            <a:r>
-              <a:rPr lang="en-US" dirty="0"/>
-              <a:t>Start thinking about how I’ll run the Monte </a:t>
-            </a:r>
-            <a:r>
-              <a:rPr lang="en-US"/>
-              <a:t>Carlo simulation</a:t>
-            </a:r>
-            <a:endParaRPr lang="en-US" dirty="0"/>
-          </a:p>
-        </p:txBody>
-      </p:sp>
-    </p:spTree>
-    <p:extLst>
-      <p:ext uri="{BB962C8B-B14F-4D97-AF65-F5344CB8AC3E}">
-        <p14:creationId xmlns:p14="http://schemas.microsoft.com/office/powerpoint/2010/main" val="3598164316"/>
-      </p:ext>
-    </p:extLst>
-  </p:cSld>
-  <p:clrMapOvr>
-    <a:masterClrMapping/>
-  </p:clrMapOvr>
-</p:sld>
-</file>
-
 <file path=ppt/slides/slide9.xml><?xml version="1.0" encoding="utf-8"?>
 <p:sld xmlns:a="http://schemas.openxmlformats.org/drawingml/2006/main" xmlns:r="http://schemas.openxmlformats.org/officeDocument/2006/relationships" xmlns:p="http://schemas.openxmlformats.org/presentationml/2006/main">
   <p:cSld>
@@ -4732,7 +4953,7 @@
           <p:cNvPr id="2" name="Title 1">
             <a:extLst>
               <a:ext uri="{FF2B5EF4-FFF2-40B4-BE49-F238E27FC236}">
-                <a16:creationId xmlns:a16="http://schemas.microsoft.com/office/drawing/2014/main" id="{02AC1237-E82F-FC48-9007-B5579512BC73}"/>
+                <a16:creationId xmlns:a16="http://schemas.microsoft.com/office/drawing/2014/main" id="{B085A5A8-D1F4-B344-BD86-87DD741C2726}"/>
               </a:ext>
             </a:extLst>
           </p:cNvPr>
@@ -4750,7 +4971,7 @@
           <a:p>
             <a:r>
               <a:rPr lang="en-US" dirty="0"/>
-              <a:t>Sources</a:t>
+              <a:t>What Next?</a:t>
             </a:r>
           </a:p>
         </p:txBody>
@@ -4760,7 +4981,7 @@
           <p:cNvPr id="3" name="Content Placeholder 2">
             <a:extLst>
               <a:ext uri="{FF2B5EF4-FFF2-40B4-BE49-F238E27FC236}">
-                <a16:creationId xmlns:a16="http://schemas.microsoft.com/office/drawing/2014/main" id="{486F7149-BE39-F745-8982-F5CCE215A810}"/>
+                <a16:creationId xmlns:a16="http://schemas.microsoft.com/office/drawing/2014/main" id="{2DE226DF-2E4B-D24B-8DB8-4BE37B821ED6}"/>
               </a:ext>
             </a:extLst>
           </p:cNvPr>
@@ -4778,17 +4999,24 @@
           <a:p>
             <a:r>
               <a:rPr lang="en-US" dirty="0"/>
-              <a:t>HOOP DIMENSIONS - </a:t>
-            </a:r>
-            <a:r>
-              <a:rPr lang="en-US" dirty="0">
-                <a:hlinkClick r:id="rId2"/>
-              </a:rPr>
-              <a:t>https://www.researchgate.net/figure/Basketball-hoop-inner-diameter-045-m-hoop-piping-diameter-002-m-and-distance-015_fig3_274248017</a:t>
-            </a:r>
-            <a:endParaRPr lang="en-US" dirty="0"/>
-          </a:p>
-          <a:p>
+              <a:t>Get 3D code fully working</a:t>
+            </a:r>
+          </a:p>
+          <a:p>
+            <a:r>
+              <a:rPr lang="en-US" dirty="0"/>
+              <a:t>Figure out energy lost for backboard and rim</a:t>
+            </a:r>
+          </a:p>
+          <a:p>
+            <a:r>
+              <a:rPr lang="en-US" dirty="0"/>
+              <a:t>Start thinking about how I’ll run the Monte </a:t>
+            </a:r>
+            <a:r>
+              <a:rPr lang="en-US"/>
+              <a:t>Carlo simulation</a:t>
+            </a:r>
             <a:endParaRPr lang="en-US" dirty="0"/>
           </a:p>
         </p:txBody>
@@ -4796,7 +5024,7 @@
     </p:spTree>
     <p:extLst>
       <p:ext uri="{BB962C8B-B14F-4D97-AF65-F5344CB8AC3E}">
-        <p14:creationId xmlns:p14="http://schemas.microsoft.com/office/powerpoint/2010/main" val="2633732305"/>
+        <p14:creationId xmlns:p14="http://schemas.microsoft.com/office/powerpoint/2010/main" val="3598164316"/>
       </p:ext>
     </p:extLst>
   </p:cSld>

</xml_diff>

<commit_message>
Got 3d-shot.py working for plotting in 3D, still working on getting its backboard 100% done
</commit_message>
<xml_diff>
--- a/Weekly Presentations/Week 2.pptx
+++ b/Weekly Presentations/Week 2.pptx
@@ -10,11 +10,12 @@
     <p:sldId id="263" r:id="rId4"/>
     <p:sldId id="264" r:id="rId5"/>
     <p:sldId id="258" r:id="rId6"/>
-    <p:sldId id="259" r:id="rId7"/>
-    <p:sldId id="265" r:id="rId8"/>
-    <p:sldId id="260" r:id="rId9"/>
-    <p:sldId id="261" r:id="rId10"/>
-    <p:sldId id="262" r:id="rId11"/>
+    <p:sldId id="266" r:id="rId7"/>
+    <p:sldId id="259" r:id="rId8"/>
+    <p:sldId id="265" r:id="rId9"/>
+    <p:sldId id="260" r:id="rId10"/>
+    <p:sldId id="261" r:id="rId11"/>
+    <p:sldId id="262" r:id="rId12"/>
   </p:sldIdLst>
   <p:sldSz cx="12192000" cy="6858000"/>
   <p:notesSz cx="6858000" cy="9144000"/>
@@ -3447,6 +3448,109 @@
           <p:cNvPr id="2" name="Title 1">
             <a:extLst>
               <a:ext uri="{FF2B5EF4-FFF2-40B4-BE49-F238E27FC236}">
+                <a16:creationId xmlns:a16="http://schemas.microsoft.com/office/drawing/2014/main" id="{B085A5A8-D1F4-B344-BD86-87DD741C2726}"/>
+              </a:ext>
+            </a:extLst>
+          </p:cNvPr>
+          <p:cNvSpPr>
+            <a:spLocks noGrp="1"/>
+          </p:cNvSpPr>
+          <p:nvPr>
+            <p:ph type="title"/>
+          </p:nvPr>
+        </p:nvSpPr>
+        <p:spPr/>
+        <p:txBody>
+          <a:bodyPr/>
+          <a:lstStyle/>
+          <a:p>
+            <a:r>
+              <a:rPr lang="en-US" dirty="0"/>
+              <a:t>What Next?</a:t>
+            </a:r>
+          </a:p>
+        </p:txBody>
+      </p:sp>
+      <p:sp>
+        <p:nvSpPr>
+          <p:cNvPr id="3" name="Content Placeholder 2">
+            <a:extLst>
+              <a:ext uri="{FF2B5EF4-FFF2-40B4-BE49-F238E27FC236}">
+                <a16:creationId xmlns:a16="http://schemas.microsoft.com/office/drawing/2014/main" id="{2DE226DF-2E4B-D24B-8DB8-4BE37B821ED6}"/>
+              </a:ext>
+            </a:extLst>
+          </p:cNvPr>
+          <p:cNvSpPr>
+            <a:spLocks noGrp="1"/>
+          </p:cNvSpPr>
+          <p:nvPr>
+            <p:ph idx="1"/>
+          </p:nvPr>
+        </p:nvSpPr>
+        <p:spPr/>
+        <p:txBody>
+          <a:bodyPr/>
+          <a:lstStyle/>
+          <a:p>
+            <a:r>
+              <a:rPr lang="en-US" dirty="0"/>
+              <a:t>Get 3D code fully working</a:t>
+            </a:r>
+          </a:p>
+          <a:p>
+            <a:r>
+              <a:rPr lang="en-US" dirty="0"/>
+              <a:t>Figure out energy lost for backboard and rim</a:t>
+            </a:r>
+          </a:p>
+          <a:p>
+            <a:r>
+              <a:rPr lang="en-US" dirty="0"/>
+              <a:t>Start thinking about how I’ll run the Monte </a:t>
+            </a:r>
+            <a:r>
+              <a:rPr lang="en-US"/>
+              <a:t>Carlo simulation</a:t>
+            </a:r>
+            <a:endParaRPr lang="en-US" dirty="0"/>
+          </a:p>
+        </p:txBody>
+      </p:sp>
+    </p:spTree>
+    <p:extLst>
+      <p:ext uri="{BB962C8B-B14F-4D97-AF65-F5344CB8AC3E}">
+        <p14:creationId xmlns:p14="http://schemas.microsoft.com/office/powerpoint/2010/main" val="3598164316"/>
+      </p:ext>
+    </p:extLst>
+  </p:cSld>
+  <p:clrMapOvr>
+    <a:masterClrMapping/>
+  </p:clrMapOvr>
+</p:sld>
+</file>
+
+<file path=ppt/slides/slide11.xml><?xml version="1.0" encoding="utf-8"?>
+<p:sld xmlns:a="http://schemas.openxmlformats.org/drawingml/2006/main" xmlns:r="http://schemas.openxmlformats.org/officeDocument/2006/relationships" xmlns:p="http://schemas.openxmlformats.org/presentationml/2006/main">
+  <p:cSld>
+    <p:spTree>
+      <p:nvGrpSpPr>
+        <p:cNvPr id="1" name=""/>
+        <p:cNvGrpSpPr/>
+        <p:nvPr/>
+      </p:nvGrpSpPr>
+      <p:grpSpPr>
+        <a:xfrm>
+          <a:off x="0" y="0"/>
+          <a:ext cx="0" cy="0"/>
+          <a:chOff x="0" y="0"/>
+          <a:chExt cx="0" cy="0"/>
+        </a:xfrm>
+      </p:grpSpPr>
+      <p:sp>
+        <p:nvSpPr>
+          <p:cNvPr id="2" name="Title 1">
+            <a:extLst>
+              <a:ext uri="{FF2B5EF4-FFF2-40B4-BE49-F238E27FC236}">
                 <a16:creationId xmlns:a16="http://schemas.microsoft.com/office/drawing/2014/main" id="{02AC1237-E82F-FC48-9007-B5579512BC73}"/>
               </a:ext>
             </a:extLst>
@@ -3501,6 +3605,22 @@
               </a:rPr>
               <a:t>https://www.researchgate.net/figure/Basketball-hoop-inner-diameter-045-m-hoop-piping-diameter-002-m-and-distance-015_fig3_274248017</a:t>
             </a:r>
+            <a:endParaRPr lang="en-US" dirty="0"/>
+          </a:p>
+          <a:p>
+            <a:r>
+              <a:rPr lang="en-US" dirty="0"/>
+              <a:t>RIM ENERGY ABSORPTION - </a:t>
+            </a:r>
+            <a:r>
+              <a:rPr lang="en-US" dirty="0">
+                <a:hlinkClick r:id="rId3"/>
+              </a:rPr>
+              <a:t>https://www.borgmanathletics.com/page/fair-court-rim-testing</a:t>
+            </a:r>
+            <a:endParaRPr lang="en-US" dirty="0"/>
+          </a:p>
+          <a:p>
             <a:endParaRPr lang="en-US" dirty="0"/>
           </a:p>
           <a:p>
@@ -4498,7 +4618,7 @@
           <p:cNvPr id="2" name="Title 1">
             <a:extLst>
               <a:ext uri="{FF2B5EF4-FFF2-40B4-BE49-F238E27FC236}">
-                <a16:creationId xmlns:a16="http://schemas.microsoft.com/office/drawing/2014/main" id="{274EA8FF-20E1-1149-A618-59FB77403647}"/>
+                <a16:creationId xmlns:a16="http://schemas.microsoft.com/office/drawing/2014/main" id="{33DB8B9E-5A72-DD41-8D26-377914B9E77C}"/>
               </a:ext>
             </a:extLst>
           </p:cNvPr>
@@ -4514,44 +4634,129 @@
           <a:bodyPr/>
           <a:lstStyle/>
           <a:p>
+            <a:endParaRPr lang="en-US"/>
+          </a:p>
+        </p:txBody>
+      </p:sp>
+      <p:sp>
+        <p:nvSpPr>
+          <p:cNvPr id="3" name="Content Placeholder 2">
+            <a:extLst>
+              <a:ext uri="{FF2B5EF4-FFF2-40B4-BE49-F238E27FC236}">
+                <a16:creationId xmlns:a16="http://schemas.microsoft.com/office/drawing/2014/main" id="{8FA82322-79DE-6748-8DC6-BE997B7804F3}"/>
+              </a:ext>
+            </a:extLst>
+          </p:cNvPr>
+          <p:cNvSpPr>
+            <a:spLocks noGrp="1"/>
+          </p:cNvSpPr>
+          <p:nvPr>
+            <p:ph idx="1"/>
+          </p:nvPr>
+        </p:nvSpPr>
+        <p:spPr/>
+        <p:txBody>
+          <a:bodyPr/>
+          <a:lstStyle/>
+          <a:p>
             <a:r>
               <a:rPr lang="en-US" dirty="0"/>
-              <a:t>What Didn’t Work</a:t>
-            </a:r>
-          </a:p>
-        </p:txBody>
-      </p:sp>
-      <p:sp>
-        <p:nvSpPr>
-          <p:cNvPr id="3" name="Content Placeholder 2">
-            <a:extLst>
-              <a:ext uri="{FF2B5EF4-FFF2-40B4-BE49-F238E27FC236}">
-                <a16:creationId xmlns:a16="http://schemas.microsoft.com/office/drawing/2014/main" id="{4E5C0D3E-D181-544B-B7A9-E923B604AACE}"/>
-              </a:ext>
-            </a:extLst>
-          </p:cNvPr>
-          <p:cNvSpPr>
-            <a:spLocks noGrp="1"/>
-          </p:cNvSpPr>
-          <p:nvPr>
-            <p:ph idx="1"/>
-          </p:nvPr>
-        </p:nvSpPr>
+              <a:t>3D shot with backboard – I also included a hoop to show where the basket is</a:t>
+            </a:r>
+          </a:p>
+        </p:txBody>
+      </p:sp>
+      <p:pic>
+        <p:nvPicPr>
+          <p:cNvPr id="5" name="Picture 4" descr="A close up of a map&#10;&#10;Description automatically generated">
+            <a:extLst>
+              <a:ext uri="{FF2B5EF4-FFF2-40B4-BE49-F238E27FC236}">
+                <a16:creationId xmlns:a16="http://schemas.microsoft.com/office/drawing/2014/main" id="{94316D6E-AA8E-F94C-B081-344EEA744DE5}"/>
+              </a:ext>
+            </a:extLst>
+          </p:cNvPr>
+          <p:cNvPicPr>
+            <a:picLocks noChangeAspect="1"/>
+          </p:cNvPicPr>
+          <p:nvPr/>
+        </p:nvPicPr>
+        <p:blipFill>
+          <a:blip r:embed="rId2"/>
+          <a:stretch>
+            <a:fillRect/>
+          </a:stretch>
+        </p:blipFill>
         <p:spPr>
           <a:xfrm>
-            <a:off x="838199" y="1825625"/>
-            <a:ext cx="5257801" cy="4351338"/>
+            <a:off x="1819431" y="2722285"/>
+            <a:ext cx="4276569" cy="3981961"/>
           </a:xfrm>
+          <a:prstGeom prst="rect">
+            <a:avLst/>
+          </a:prstGeom>
         </p:spPr>
-        <p:txBody>
-          <a:bodyPr>
-            <a:normAutofit/>
+      </p:pic>
+      <p:pic>
+        <p:nvPicPr>
+          <p:cNvPr id="7" name="Picture 6" descr="A picture containing game&#10;&#10;Description automatically generated">
+            <a:extLst>
+              <a:ext uri="{FF2B5EF4-FFF2-40B4-BE49-F238E27FC236}">
+                <a16:creationId xmlns:a16="http://schemas.microsoft.com/office/drawing/2014/main" id="{142A1DDF-BAAA-CA45-8706-1867FB6551CB}"/>
+              </a:ext>
+            </a:extLst>
+          </p:cNvPr>
+          <p:cNvPicPr>
+            <a:picLocks noChangeAspect="1"/>
+          </p:cNvPicPr>
+          <p:nvPr/>
+        </p:nvPicPr>
+        <p:blipFill>
+          <a:blip r:embed="rId3"/>
+          <a:stretch>
+            <a:fillRect/>
+          </a:stretch>
+        </p:blipFill>
+        <p:spPr>
+          <a:xfrm>
+            <a:off x="6096000" y="2795295"/>
+            <a:ext cx="4276569" cy="3645309"/>
+          </a:xfrm>
+          <a:prstGeom prst="rect">
+            <a:avLst/>
+          </a:prstGeom>
+        </p:spPr>
+      </p:pic>
+      <p:sp>
+        <p:nvSpPr>
+          <p:cNvPr id="8" name="TextBox 7">
+            <a:extLst>
+              <a:ext uri="{FF2B5EF4-FFF2-40B4-BE49-F238E27FC236}">
+                <a16:creationId xmlns:a16="http://schemas.microsoft.com/office/drawing/2014/main" id="{71A89DDF-DE51-AD45-8758-AA7828FD0823}"/>
+              </a:ext>
+            </a:extLst>
+          </p:cNvPr>
+          <p:cNvSpPr txBox="1"/>
+          <p:nvPr/>
+        </p:nvSpPr>
+        <p:spPr>
+          <a:xfrm>
+            <a:off x="6285610" y="6351853"/>
+            <a:ext cx="3897349" cy="369332"/>
+          </a:xfrm>
+          <a:prstGeom prst="rect">
+            <a:avLst/>
+          </a:prstGeom>
+          <a:noFill/>
+        </p:spPr>
+        <p:txBody>
+          <a:bodyPr wrap="none" rtlCol="0">
+            <a:spAutoFit/>
           </a:bodyPr>
           <a:lstStyle/>
           <a:p>
             <a:r>
               <a:rPr lang="en-US" dirty="0"/>
-              <a:t>Plotting in 3D – I had an import problem</a:t>
+              <a:t>Middle shot from the last slide, goes in!</a:t>
             </a:r>
           </a:p>
         </p:txBody>
@@ -4559,7 +4764,7 @@
     </p:spTree>
     <p:extLst>
       <p:ext uri="{BB962C8B-B14F-4D97-AF65-F5344CB8AC3E}">
-        <p14:creationId xmlns:p14="http://schemas.microsoft.com/office/powerpoint/2010/main" val="3887581411"/>
+        <p14:creationId xmlns:p14="http://schemas.microsoft.com/office/powerpoint/2010/main" val="2296765090"/>
       </p:ext>
     </p:extLst>
   </p:cSld>
@@ -4591,7 +4796,7 @@
           <p:cNvPr id="2" name="Title 1">
             <a:extLst>
               <a:ext uri="{FF2B5EF4-FFF2-40B4-BE49-F238E27FC236}">
-                <a16:creationId xmlns:a16="http://schemas.microsoft.com/office/drawing/2014/main" id="{CF0EC7FC-8417-CB43-A183-D82609609ED1}"/>
+                <a16:creationId xmlns:a16="http://schemas.microsoft.com/office/drawing/2014/main" id="{274EA8FF-20E1-1149-A618-59FB77403647}"/>
               </a:ext>
             </a:extLst>
           </p:cNvPr>
@@ -4619,7 +4824,7 @@
           <p:cNvPr id="3" name="Content Placeholder 2">
             <a:extLst>
               <a:ext uri="{FF2B5EF4-FFF2-40B4-BE49-F238E27FC236}">
-                <a16:creationId xmlns:a16="http://schemas.microsoft.com/office/drawing/2014/main" id="{4B7931FC-2D28-6F48-A560-7AC4C09F2532}"/>
+                <a16:creationId xmlns:a16="http://schemas.microsoft.com/office/drawing/2014/main" id="{4E5C0D3E-D181-544B-B7A9-E923B604AACE}"/>
               </a:ext>
             </a:extLst>
           </p:cNvPr>
@@ -4632,29 +4837,53 @@
         </p:nvSpPr>
         <p:spPr>
           <a:xfrm>
-            <a:off x="838200" y="1825625"/>
-            <a:ext cx="10389243" cy="848127"/>
+            <a:off x="838199" y="1825625"/>
+            <a:ext cx="10515600" cy="4351338"/>
           </a:xfrm>
         </p:spPr>
         <p:txBody>
           <a:bodyPr>
-            <a:normAutofit lnSpcReduction="10000"/>
+            <a:normAutofit/>
           </a:bodyPr>
           <a:lstStyle/>
           <a:p>
             <a:r>
               <a:rPr lang="en-US" dirty="0"/>
-              <a:t>Sometimes when I limited the 3D plotting to 2D it would work but other times it wouldn’t</a:t>
+              <a:t>This shot should’ve gone in according to the first plot two slides ago (</a:t>
+            </a:r>
+            <a:r>
+              <a:rPr lang="en-US" dirty="0" err="1"/>
+              <a:t>start_height</a:t>
+            </a:r>
+            <a:r>
+              <a:rPr lang="en-US" dirty="0"/>
+              <a:t> = 1.8; v0 = 9.8; angle = 80; </a:t>
+            </a:r>
+            <a:r>
+              <a:rPr lang="en-US" dirty="0" err="1"/>
+              <a:t>start_y</a:t>
+            </a:r>
+            <a:r>
+              <a:rPr lang="en-US" dirty="0"/>
+              <a:t> = 2.5; </a:t>
+            </a:r>
+            <a:r>
+              <a:rPr lang="en-US" dirty="0" err="1"/>
+              <a:t>start_x</a:t>
+            </a:r>
+            <a:r>
+              <a:rPr lang="en-US" dirty="0"/>
+              <a:t> = 0), but it didn’t in 3D</a:t>
             </a:r>
           </a:p>
         </p:txBody>
       </p:sp>
       <p:pic>
         <p:nvPicPr>
-          <p:cNvPr id="5" name="Picture 4">
-            <a:extLst>
-              <a:ext uri="{FF2B5EF4-FFF2-40B4-BE49-F238E27FC236}">
-                <a16:creationId xmlns:a16="http://schemas.microsoft.com/office/drawing/2014/main" id="{44B4FE88-1F0F-F947-8E87-0D53CAE89826}"/>
+          <p:cNvPr id="13" name="Picture 12" descr="A close up of a map&#10;&#10;Description automatically generated">
+            <a:extLst>
+              <a:ext uri="{FF2B5EF4-FFF2-40B4-BE49-F238E27FC236}">
+                <a16:creationId xmlns:a16="http://schemas.microsoft.com/office/drawing/2014/main" id="{0B56A640-6662-5D47-BFD2-57F7E70738E2}"/>
               </a:ext>
             </a:extLst>
           </p:cNvPr>
@@ -4671,136 +4900,18 @@
         </p:blipFill>
         <p:spPr>
           <a:xfrm>
-            <a:off x="809408" y="2673752"/>
-            <a:ext cx="4296991" cy="3396518"/>
+            <a:off x="1336831" y="2968589"/>
+            <a:ext cx="4089608" cy="3208374"/>
           </a:xfrm>
           <a:prstGeom prst="rect">
             <a:avLst/>
           </a:prstGeom>
         </p:spPr>
       </p:pic>
-      <p:sp>
-        <p:nvSpPr>
-          <p:cNvPr id="6" name="TextBox 5">
-            <a:extLst>
-              <a:ext uri="{FF2B5EF4-FFF2-40B4-BE49-F238E27FC236}">
-                <a16:creationId xmlns:a16="http://schemas.microsoft.com/office/drawing/2014/main" id="{41F4AB93-E99D-4142-BABC-91892243AF9D}"/>
-              </a:ext>
-            </a:extLst>
-          </p:cNvPr>
-          <p:cNvSpPr txBox="1"/>
-          <p:nvPr/>
-        </p:nvSpPr>
-        <p:spPr>
-          <a:xfrm>
-            <a:off x="426152" y="6166713"/>
-            <a:ext cx="5063502" cy="646331"/>
-          </a:xfrm>
-          <a:prstGeom prst="rect">
-            <a:avLst/>
-          </a:prstGeom>
-          <a:noFill/>
-        </p:spPr>
-        <p:txBody>
-          <a:bodyPr wrap="none" rtlCol="0">
-            <a:spAutoFit/>
-          </a:bodyPr>
-          <a:lstStyle/>
-          <a:p>
-            <a:r>
-              <a:rPr lang="en-US" dirty="0"/>
-              <a:t>It worked here, for a shot that we know goes in:</a:t>
-            </a:r>
-          </a:p>
-          <a:p>
-            <a:r>
-              <a:rPr lang="en-US" dirty="0" err="1"/>
-              <a:t>Start_height</a:t>
-            </a:r>
-            <a:r>
-              <a:rPr lang="en-US" dirty="0"/>
-              <a:t> = 1.8; v0 = 9.8; angle = 80; </a:t>
-            </a:r>
-            <a:r>
-              <a:rPr lang="en-US" dirty="0" err="1"/>
-              <a:t>start_y</a:t>
-            </a:r>
-            <a:r>
-              <a:rPr lang="en-US" dirty="0"/>
-              <a:t> = 2.5</a:t>
-            </a:r>
-          </a:p>
-        </p:txBody>
-      </p:sp>
-      <p:pic>
-        <p:nvPicPr>
-          <p:cNvPr id="7" name="Picture 6">
-            <a:extLst>
-              <a:ext uri="{FF2B5EF4-FFF2-40B4-BE49-F238E27FC236}">
-                <a16:creationId xmlns:a16="http://schemas.microsoft.com/office/drawing/2014/main" id="{D81534E2-98F1-4B48-ADDB-2C41353BE79E}"/>
-              </a:ext>
-            </a:extLst>
-          </p:cNvPr>
-          <p:cNvPicPr>
-            <a:picLocks noChangeAspect="1"/>
-          </p:cNvPicPr>
-          <p:nvPr/>
-        </p:nvPicPr>
-        <p:blipFill>
-          <a:blip r:embed="rId3"/>
-          <a:stretch>
-            <a:fillRect/>
-          </a:stretch>
-        </p:blipFill>
-        <p:spPr>
-          <a:xfrm>
-            <a:off x="6944109" y="2673752"/>
-            <a:ext cx="4438483" cy="3492961"/>
-          </a:xfrm>
-          <a:prstGeom prst="rect">
-            <a:avLst/>
-          </a:prstGeom>
-        </p:spPr>
-      </p:pic>
-      <p:sp>
-        <p:nvSpPr>
-          <p:cNvPr id="8" name="TextBox 7">
-            <a:extLst>
-              <a:ext uri="{FF2B5EF4-FFF2-40B4-BE49-F238E27FC236}">
-                <a16:creationId xmlns:a16="http://schemas.microsoft.com/office/drawing/2014/main" id="{03AA3D39-CD5C-ED4D-956B-CB4ECA18BF69}"/>
-              </a:ext>
-            </a:extLst>
-          </p:cNvPr>
-          <p:cNvSpPr txBox="1"/>
-          <p:nvPr/>
-        </p:nvSpPr>
-        <p:spPr>
-          <a:xfrm>
-            <a:off x="6096000" y="6166712"/>
-            <a:ext cx="6095035" cy="646331"/>
-          </a:xfrm>
-          <a:prstGeom prst="rect">
-            <a:avLst/>
-          </a:prstGeom>
-          <a:noFill/>
-        </p:spPr>
-        <p:txBody>
-          <a:bodyPr wrap="square" rtlCol="0">
-            <a:spAutoFit/>
-          </a:bodyPr>
-          <a:lstStyle/>
-          <a:p>
-            <a:r>
-              <a:rPr lang="en-US" dirty="0"/>
-              <a:t>But something weird happened here (same initial conditions as the previous shot but a starting y distance of 2 instead of 2.5</a:t>
-            </a:r>
-          </a:p>
-        </p:txBody>
-      </p:sp>
     </p:spTree>
     <p:extLst>
       <p:ext uri="{BB962C8B-B14F-4D97-AF65-F5344CB8AC3E}">
-        <p14:creationId xmlns:p14="http://schemas.microsoft.com/office/powerpoint/2010/main" val="1112084708"/>
+        <p14:creationId xmlns:p14="http://schemas.microsoft.com/office/powerpoint/2010/main" val="3887581411"/>
       </p:ext>
     </p:extLst>
   </p:cSld>
@@ -4832,7 +4943,7 @@
           <p:cNvPr id="2" name="Title 1">
             <a:extLst>
               <a:ext uri="{FF2B5EF4-FFF2-40B4-BE49-F238E27FC236}">
-                <a16:creationId xmlns:a16="http://schemas.microsoft.com/office/drawing/2014/main" id="{65B26CA2-CAE2-014D-AC26-404C9761934E}"/>
+                <a16:creationId xmlns:a16="http://schemas.microsoft.com/office/drawing/2014/main" id="{CF0EC7FC-8417-CB43-A183-D82609609ED1}"/>
               </a:ext>
             </a:extLst>
           </p:cNvPr>
@@ -4850,7 +4961,7 @@
           <a:p>
             <a:r>
               <a:rPr lang="en-US" dirty="0"/>
-              <a:t>Where am I Stuck</a:t>
+              <a:t>What Didn’t Work</a:t>
             </a:r>
           </a:p>
         </p:txBody>
@@ -4860,7 +4971,7 @@
           <p:cNvPr id="3" name="Content Placeholder 2">
             <a:extLst>
               <a:ext uri="{FF2B5EF4-FFF2-40B4-BE49-F238E27FC236}">
-                <a16:creationId xmlns:a16="http://schemas.microsoft.com/office/drawing/2014/main" id="{46B900D3-ACC0-CF4B-BD4F-23D56CBCDCAB}"/>
+                <a16:creationId xmlns:a16="http://schemas.microsoft.com/office/drawing/2014/main" id="{4B7931FC-2D28-6F48-A560-7AC4C09F2532}"/>
               </a:ext>
             </a:extLst>
           </p:cNvPr>
@@ -4874,26 +4985,28 @@
         <p:spPr>
           <a:xfrm>
             <a:off x="838200" y="1825625"/>
-            <a:ext cx="5257800" cy="4351338"/>
+            <a:ext cx="10389243" cy="848127"/>
           </a:xfrm>
         </p:spPr>
         <p:txBody>
-          <a:bodyPr/>
+          <a:bodyPr>
+            <a:normAutofit lnSpcReduction="10000"/>
+          </a:bodyPr>
           <a:lstStyle/>
           <a:p>
             <a:r>
               <a:rPr lang="en-US" dirty="0"/>
-              <a:t>How should I handle the rim of the hoop? It’s possible for the basketball to hit the rim and not bounce into the basket. If it hits the rim and bounces in, should I assume an elastic collision? I couldn’t find any info on the amount of energy lost when the basketball hits the rim. </a:t>
+              <a:t>Sometimes when I limited the 3D plotting to 2D it would work but other times it wouldn’t</a:t>
             </a:r>
           </a:p>
         </p:txBody>
       </p:sp>
       <p:pic>
         <p:nvPicPr>
-          <p:cNvPr id="8" name="Picture 7" descr="Birds eye view of basketball hoop">
-            <a:extLst>
-              <a:ext uri="{FF2B5EF4-FFF2-40B4-BE49-F238E27FC236}">
-                <a16:creationId xmlns:a16="http://schemas.microsoft.com/office/drawing/2014/main" id="{1EBC0ED4-0764-064D-9B71-1B723AF849F0}"/>
+          <p:cNvPr id="5" name="Picture 4">
+            <a:extLst>
+              <a:ext uri="{FF2B5EF4-FFF2-40B4-BE49-F238E27FC236}">
+                <a16:creationId xmlns:a16="http://schemas.microsoft.com/office/drawing/2014/main" id="{44B4FE88-1F0F-F947-8E87-0D53CAE89826}"/>
               </a:ext>
             </a:extLst>
           </p:cNvPr>
@@ -4910,18 +5023,136 @@
         </p:blipFill>
         <p:spPr>
           <a:xfrm>
-            <a:off x="6287047" y="845344"/>
-            <a:ext cx="5404890" cy="5167312"/>
+            <a:off x="809408" y="2673752"/>
+            <a:ext cx="4296991" cy="3396518"/>
           </a:xfrm>
           <a:prstGeom prst="rect">
             <a:avLst/>
           </a:prstGeom>
         </p:spPr>
       </p:pic>
+      <p:sp>
+        <p:nvSpPr>
+          <p:cNvPr id="6" name="TextBox 5">
+            <a:extLst>
+              <a:ext uri="{FF2B5EF4-FFF2-40B4-BE49-F238E27FC236}">
+                <a16:creationId xmlns:a16="http://schemas.microsoft.com/office/drawing/2014/main" id="{41F4AB93-E99D-4142-BABC-91892243AF9D}"/>
+              </a:ext>
+            </a:extLst>
+          </p:cNvPr>
+          <p:cNvSpPr txBox="1"/>
+          <p:nvPr/>
+        </p:nvSpPr>
+        <p:spPr>
+          <a:xfrm>
+            <a:off x="426152" y="6166713"/>
+            <a:ext cx="5063502" cy="646331"/>
+          </a:xfrm>
+          <a:prstGeom prst="rect">
+            <a:avLst/>
+          </a:prstGeom>
+          <a:noFill/>
+        </p:spPr>
+        <p:txBody>
+          <a:bodyPr wrap="none" rtlCol="0">
+            <a:spAutoFit/>
+          </a:bodyPr>
+          <a:lstStyle/>
+          <a:p>
+            <a:r>
+              <a:rPr lang="en-US" dirty="0"/>
+              <a:t>It worked here, for a shot that we know goes in:</a:t>
+            </a:r>
+          </a:p>
+          <a:p>
+            <a:r>
+              <a:rPr lang="en-US" dirty="0" err="1"/>
+              <a:t>Start_height</a:t>
+            </a:r>
+            <a:r>
+              <a:rPr lang="en-US" dirty="0"/>
+              <a:t> = 1.8; v0 = 9.8; angle = 80; </a:t>
+            </a:r>
+            <a:r>
+              <a:rPr lang="en-US" dirty="0" err="1"/>
+              <a:t>start_y</a:t>
+            </a:r>
+            <a:r>
+              <a:rPr lang="en-US" dirty="0"/>
+              <a:t> = 2.5</a:t>
+            </a:r>
+          </a:p>
+        </p:txBody>
+      </p:sp>
+      <p:pic>
+        <p:nvPicPr>
+          <p:cNvPr id="7" name="Picture 6">
+            <a:extLst>
+              <a:ext uri="{FF2B5EF4-FFF2-40B4-BE49-F238E27FC236}">
+                <a16:creationId xmlns:a16="http://schemas.microsoft.com/office/drawing/2014/main" id="{D81534E2-98F1-4B48-ADDB-2C41353BE79E}"/>
+              </a:ext>
+            </a:extLst>
+          </p:cNvPr>
+          <p:cNvPicPr>
+            <a:picLocks noChangeAspect="1"/>
+          </p:cNvPicPr>
+          <p:nvPr/>
+        </p:nvPicPr>
+        <p:blipFill>
+          <a:blip r:embed="rId3"/>
+          <a:stretch>
+            <a:fillRect/>
+          </a:stretch>
+        </p:blipFill>
+        <p:spPr>
+          <a:xfrm>
+            <a:off x="6944109" y="2673752"/>
+            <a:ext cx="4438483" cy="3492961"/>
+          </a:xfrm>
+          <a:prstGeom prst="rect">
+            <a:avLst/>
+          </a:prstGeom>
+        </p:spPr>
+      </p:pic>
+      <p:sp>
+        <p:nvSpPr>
+          <p:cNvPr id="8" name="TextBox 7">
+            <a:extLst>
+              <a:ext uri="{FF2B5EF4-FFF2-40B4-BE49-F238E27FC236}">
+                <a16:creationId xmlns:a16="http://schemas.microsoft.com/office/drawing/2014/main" id="{03AA3D39-CD5C-ED4D-956B-CB4ECA18BF69}"/>
+              </a:ext>
+            </a:extLst>
+          </p:cNvPr>
+          <p:cNvSpPr txBox="1"/>
+          <p:nvPr/>
+        </p:nvSpPr>
+        <p:spPr>
+          <a:xfrm>
+            <a:off x="6096000" y="6166712"/>
+            <a:ext cx="6095035" cy="646331"/>
+          </a:xfrm>
+          <a:prstGeom prst="rect">
+            <a:avLst/>
+          </a:prstGeom>
+          <a:noFill/>
+        </p:spPr>
+        <p:txBody>
+          <a:bodyPr wrap="square" rtlCol="0">
+            <a:spAutoFit/>
+          </a:bodyPr>
+          <a:lstStyle/>
+          <a:p>
+            <a:r>
+              <a:rPr lang="en-US" dirty="0"/>
+              <a:t>But something weird happened here (same initial conditions as the previous shot but a starting y distance of 2 instead of 2.5</a:t>
+            </a:r>
+          </a:p>
+        </p:txBody>
+      </p:sp>
     </p:spTree>
     <p:extLst>
       <p:ext uri="{BB962C8B-B14F-4D97-AF65-F5344CB8AC3E}">
-        <p14:creationId xmlns:p14="http://schemas.microsoft.com/office/powerpoint/2010/main" val="3526662746"/>
+        <p14:creationId xmlns:p14="http://schemas.microsoft.com/office/powerpoint/2010/main" val="1112084708"/>
       </p:ext>
     </p:extLst>
   </p:cSld>
@@ -4953,7 +5184,7 @@
           <p:cNvPr id="2" name="Title 1">
             <a:extLst>
               <a:ext uri="{FF2B5EF4-FFF2-40B4-BE49-F238E27FC236}">
-                <a16:creationId xmlns:a16="http://schemas.microsoft.com/office/drawing/2014/main" id="{B085A5A8-D1F4-B344-BD86-87DD741C2726}"/>
+                <a16:creationId xmlns:a16="http://schemas.microsoft.com/office/drawing/2014/main" id="{65B26CA2-CAE2-014D-AC26-404C9761934E}"/>
               </a:ext>
             </a:extLst>
           </p:cNvPr>
@@ -4971,7 +5202,7 @@
           <a:p>
             <a:r>
               <a:rPr lang="en-US" dirty="0"/>
-              <a:t>What Next?</a:t>
+              <a:t>Where am I Stuck</a:t>
             </a:r>
           </a:p>
         </p:txBody>
@@ -4981,7 +5212,7 @@
           <p:cNvPr id="3" name="Content Placeholder 2">
             <a:extLst>
               <a:ext uri="{FF2B5EF4-FFF2-40B4-BE49-F238E27FC236}">
-                <a16:creationId xmlns:a16="http://schemas.microsoft.com/office/drawing/2014/main" id="{2DE226DF-2E4B-D24B-8DB8-4BE37B821ED6}"/>
+                <a16:creationId xmlns:a16="http://schemas.microsoft.com/office/drawing/2014/main" id="{46B900D3-ACC0-CF4B-BD4F-23D56CBCDCAB}"/>
               </a:ext>
             </a:extLst>
           </p:cNvPr>
@@ -4992,39 +5223,72 @@
             <p:ph idx="1"/>
           </p:nvPr>
         </p:nvSpPr>
-        <p:spPr/>
-        <p:txBody>
-          <a:bodyPr/>
-          <a:lstStyle/>
-          <a:p>
-            <a:r>
-              <a:rPr lang="en-US" dirty="0"/>
-              <a:t>Get 3D code fully working</a:t>
-            </a:r>
-          </a:p>
-          <a:p>
-            <a:r>
-              <a:rPr lang="en-US" dirty="0"/>
-              <a:t>Figure out energy lost for backboard and rim</a:t>
-            </a:r>
-          </a:p>
-          <a:p>
-            <a:r>
-              <a:rPr lang="en-US" dirty="0"/>
-              <a:t>Start thinking about how I’ll run the Monte </a:t>
-            </a:r>
-            <a:r>
-              <a:rPr lang="en-US"/>
-              <a:t>Carlo simulation</a:t>
-            </a:r>
-            <a:endParaRPr lang="en-US" dirty="0"/>
-          </a:p>
-        </p:txBody>
-      </p:sp>
+        <p:spPr>
+          <a:xfrm>
+            <a:off x="838200" y="1825624"/>
+            <a:ext cx="5257800" cy="4505727"/>
+          </a:xfrm>
+        </p:spPr>
+        <p:txBody>
+          <a:bodyPr>
+            <a:noAutofit/>
+          </a:bodyPr>
+          <a:lstStyle/>
+          <a:p>
+            <a:r>
+              <a:rPr lang="en-US" sz="2200" dirty="0"/>
+              <a:t>How should I handle the rim of the hoop? It’s possible for the basketball to hit the rim and not bounce into the basket. Can we assume if some point along the diameter of the basketball hits the rim it will/won’t bounce towards the basket? If it hits the rim and bounces in, should I assume an elastic collision?</a:t>
+            </a:r>
+          </a:p>
+          <a:p>
+            <a:r>
+              <a:rPr lang="en-GB" sz="2200" dirty="0"/>
+              <a:t>"the rebound elasticity of any basket ring support system shall be within a 35 percent to 50 percent energy-absorption range of total impact energy, and within a 5 percent differential between baskets on the same court.” </a:t>
+            </a:r>
+            <a:r>
+              <a:rPr lang="en-GB" sz="2200" dirty="0">
+                <a:sym typeface="Wingdings" pitchFamily="2" charset="2"/>
+              </a:rPr>
+              <a:t> but are we using the same material for the rim?</a:t>
+            </a:r>
+            <a:endParaRPr lang="en-US" sz="2200" dirty="0"/>
+          </a:p>
+        </p:txBody>
+      </p:sp>
+      <p:pic>
+        <p:nvPicPr>
+          <p:cNvPr id="8" name="Picture 7" descr="Birds eye view of basketball hoop">
+            <a:extLst>
+              <a:ext uri="{FF2B5EF4-FFF2-40B4-BE49-F238E27FC236}">
+                <a16:creationId xmlns:a16="http://schemas.microsoft.com/office/drawing/2014/main" id="{1EBC0ED4-0764-064D-9B71-1B723AF849F0}"/>
+              </a:ext>
+            </a:extLst>
+          </p:cNvPr>
+          <p:cNvPicPr>
+            <a:picLocks noChangeAspect="1"/>
+          </p:cNvPicPr>
+          <p:nvPr/>
+        </p:nvPicPr>
+        <p:blipFill>
+          <a:blip r:embed="rId2"/>
+          <a:stretch>
+            <a:fillRect/>
+          </a:stretch>
+        </p:blipFill>
+        <p:spPr>
+          <a:xfrm>
+            <a:off x="6287047" y="845344"/>
+            <a:ext cx="5404890" cy="5167312"/>
+          </a:xfrm>
+          <a:prstGeom prst="rect">
+            <a:avLst/>
+          </a:prstGeom>
+        </p:spPr>
+      </p:pic>
     </p:spTree>
     <p:extLst>
       <p:ext uri="{BB962C8B-B14F-4D97-AF65-F5344CB8AC3E}">
-        <p14:creationId xmlns:p14="http://schemas.microsoft.com/office/powerpoint/2010/main" val="3598164316"/>
+        <p14:creationId xmlns:p14="http://schemas.microsoft.com/office/powerpoint/2010/main" val="3526662746"/>
       </p:ext>
     </p:extLst>
   </p:cSld>

</xml_diff>